<commit_message>
Presentable. Progress on the flippable cards, but not usable.
</commit_message>
<xml_diff>
--- a/assets/presentation_intro.pptx
+++ b/assets/presentation_intro.pptx
@@ -110,6 +110,11 @@
       </a:defRPr>
     </a:lvl9pPr>
   </p:defaultTextStyle>
+  <p:extLst>
+    <p:ext uri="{EFAFB233-063F-42B5-8137-9DF3F51BA10A}">
+      <p15:sldGuideLst xmlns:p15="http://schemas.microsoft.com/office/powerpoint/2012/main"/>
+    </p:ext>
+  </p:extLst>
 </p:presentation>
 </file>
 
@@ -276,7 +281,7 @@
           <a:p>
             <a:fld id="{403CB87E-4591-47A1-9046-CF63F17215EF}" type="datetime2">
               <a:rPr lang="en-US" smtClean="0"/>
-              <a:t>Thursday, January 20, 2022</a:t>
+              <a:t>Friday, January 21, 2022</a:t>
             </a:fld>
             <a:endParaRPr lang="en-US" dirty="0"/>
           </a:p>
@@ -498,7 +503,7 @@
           <a:p>
             <a:fld id="{2FA17F0E-8070-4DFE-A821-9A699EDBAD7E}" type="datetime2">
               <a:rPr lang="en-US" smtClean="0"/>
-              <a:t>Thursday, January 20, 2022</a:t>
+              <a:t>Friday, January 21, 2022</a:t>
             </a:fld>
             <a:endParaRPr lang="en-US"/>
           </a:p>
@@ -710,7 +715,7 @@
           <a:p>
             <a:fld id="{D88D34AE-C7BF-46E5-A968-01C6641F6476}" type="datetime2">
               <a:rPr lang="en-US" smtClean="0"/>
-              <a:t>Thursday, January 20, 2022</a:t>
+              <a:t>Friday, January 21, 2022</a:t>
             </a:fld>
             <a:endParaRPr lang="en-US"/>
           </a:p>
@@ -951,7 +956,7 @@
           <a:p>
             <a:fld id="{F33DE70B-B772-416E-A790-995760B1742E}" type="datetime2">
               <a:rPr lang="en-US" smtClean="0"/>
-              <a:t>Thursday, January 20, 2022</a:t>
+              <a:t>Friday, January 21, 2022</a:t>
             </a:fld>
             <a:endParaRPr lang="en-US" dirty="0"/>
           </a:p>
@@ -1250,7 +1255,7 @@
           <a:p>
             <a:fld id="{76760CDE-A6F1-4138-AF12-ED09E8E5FB6B}" type="datetime2">
               <a:rPr lang="en-US" smtClean="0"/>
-              <a:t>Thursday, January 20, 2022</a:t>
+              <a:t>Friday, January 21, 2022</a:t>
             </a:fld>
             <a:endParaRPr lang="en-US"/>
           </a:p>
@@ -1582,7 +1587,7 @@
           <a:p>
             <a:fld id="{DB15F8B1-DB7B-4D28-A97D-40FB2DD1EF78}" type="datetime2">
               <a:rPr lang="en-US" smtClean="0"/>
-              <a:t>Thursday, January 20, 2022</a:t>
+              <a:t>Friday, January 21, 2022</a:t>
             </a:fld>
             <a:endParaRPr lang="en-US"/>
           </a:p>
@@ -2028,7 +2033,7 @@
           <a:p>
             <a:fld id="{14039161-23B8-4738-9069-73EBE8884FDD}" type="datetime2">
               <a:rPr lang="en-US" smtClean="0"/>
-              <a:t>Thursday, January 20, 2022</a:t>
+              <a:t>Friday, January 21, 2022</a:t>
             </a:fld>
             <a:endParaRPr lang="en-US"/>
           </a:p>
@@ -2184,7 +2189,7 @@
           <a:p>
             <a:fld id="{FA994D44-7693-499F-AC6C-11696134FE3F}" type="datetime2">
               <a:rPr lang="en-US" smtClean="0"/>
-              <a:t>Thursday, January 20, 2022</a:t>
+              <a:t>Friday, January 21, 2022</a:t>
             </a:fld>
             <a:endParaRPr lang="en-US"/>
           </a:p>
@@ -2301,7 +2306,7 @@
           <a:p>
             <a:fld id="{363AF2AE-472C-4EF3-ABB2-24BAA9AE3CF7}" type="datetime2">
               <a:rPr lang="en-US" smtClean="0"/>
-              <a:t>Thursday, January 20, 2022</a:t>
+              <a:t>Friday, January 21, 2022</a:t>
             </a:fld>
             <a:endParaRPr lang="en-US"/>
           </a:p>
@@ -2628,7 +2633,7 @@
           <a:p>
             <a:fld id="{EAEA162C-A7C1-4263-9453-1BAFF8C39559}" type="datetime2">
               <a:rPr lang="en-US" smtClean="0"/>
-              <a:t>Thursday, January 20, 2022</a:t>
+              <a:t>Friday, January 21, 2022</a:t>
             </a:fld>
             <a:endParaRPr lang="en-US"/>
           </a:p>
@@ -2934,7 +2939,7 @@
           <a:p>
             <a:fld id="{64DF6793-3458-4587-8168-65F0C37A92D2}" type="datetime2">
               <a:rPr lang="en-US" smtClean="0"/>
-              <a:t>Thursday, January 20, 2022</a:t>
+              <a:t>Friday, January 21, 2022</a:t>
             </a:fld>
             <a:endParaRPr lang="en-US"/>
           </a:p>
@@ -3287,7 +3292,7 @@
             <a:fld id="{E8352ED3-3C46-4C9A-9738-67B2D875E7E2}" type="datetime2">
               <a:rPr lang="en-US" smtClean="0"/>
               <a:pPr/>
-              <a:t>Thursday, January 20, 2022</a:t>
+              <a:t>Friday, January 21, 2022</a:t>
             </a:fld>
             <a:endParaRPr lang="en-US" dirty="0"/>
           </a:p>

</xml_diff>

<commit_message>
What I presented. Updated ppt. Dynamic titles on some graphs.
</commit_message>
<xml_diff>
--- a/assets/presentation_intro.pptx
+++ b/assets/presentation_intro.pptx
@@ -8,10 +8,13 @@
     <p:sldId id="256" r:id="rId2"/>
     <p:sldId id="258" r:id="rId3"/>
     <p:sldId id="263" r:id="rId4"/>
-    <p:sldId id="260" r:id="rId5"/>
-    <p:sldId id="261" r:id="rId6"/>
-    <p:sldId id="262" r:id="rId7"/>
-    <p:sldId id="259" r:id="rId8"/>
+    <p:sldId id="265" r:id="rId5"/>
+    <p:sldId id="260" r:id="rId6"/>
+    <p:sldId id="261" r:id="rId7"/>
+    <p:sldId id="262" r:id="rId8"/>
+    <p:sldId id="259" r:id="rId9"/>
+    <p:sldId id="264" r:id="rId10"/>
+    <p:sldId id="266" r:id="rId11"/>
   </p:sldIdLst>
   <p:sldSz cx="12192000" cy="6858000"/>
   <p:notesSz cx="6858000" cy="9144000"/>
@@ -118,6 +121,641 @@
 </p:presentation>
 </file>
 
+<file path=ppt/charts/chartEx1.xml><?xml version="1.0" encoding="utf-8"?>
+<cx:chartSpace xmlns:a="http://schemas.openxmlformats.org/drawingml/2006/main" xmlns:r="http://schemas.openxmlformats.org/officeDocument/2006/relationships" xmlns:cx="http://schemas.microsoft.com/office/drawing/2014/chartex">
+  <cx:chartData>
+    <cx:externalData r:id="rId1" cx:autoUpdate="0"/>
+    <cx:data id="0">
+      <cx:strDim type="cat">
+        <cx:f>Sheet1!$A$2:$A$6</cx:f>
+        <cx:lvl ptCount="5">
+          <cx:pt idx="0">Category 1</cx:pt>
+          <cx:pt idx="1">Category 2</cx:pt>
+          <cx:pt idx="2">Category 3</cx:pt>
+        </cx:lvl>
+      </cx:strDim>
+      <cx:numDim type="val">
+        <cx:f>Sheet1!$B$2:$B$6</cx:f>
+        <cx:lvl ptCount="5" formatCode="General">
+          <cx:pt idx="0">5000</cx:pt>
+          <cx:pt idx="1">4000</cx:pt>
+          <cx:pt idx="2">3000</cx:pt>
+        </cx:lvl>
+      </cx:numDim>
+    </cx:data>
+  </cx:chartData>
+  <cx:chart>
+    <cx:plotArea>
+      <cx:plotAreaRegion>
+        <cx:series layoutId="funnel" uniqueId="{E1D8F9AD-E230-40CE-94B1-5D0F05ACF090}">
+          <cx:tx>
+            <cx:txData>
+              <cx:f>Sheet1!$B$1</cx:f>
+              <cx:v>Series1</cx:v>
+            </cx:txData>
+          </cx:tx>
+          <cx:spPr>
+            <a:solidFill>
+              <a:srgbClr val="C00000"/>
+            </a:solidFill>
+          </cx:spPr>
+          <cx:dataPt idx="0">
+            <cx:spPr>
+              <a:solidFill>
+                <a:srgbClr val="CFEFFD"/>
+              </a:solidFill>
+            </cx:spPr>
+          </cx:dataPt>
+          <cx:dataPt idx="1">
+            <cx:spPr>
+              <a:solidFill>
+                <a:srgbClr val="626971"/>
+              </a:solidFill>
+            </cx:spPr>
+          </cx:dataPt>
+          <cx:dataPt idx="2">
+            <cx:spPr>
+              <a:solidFill>
+                <a:srgbClr val="E5505C"/>
+              </a:solidFill>
+            </cx:spPr>
+          </cx:dataPt>
+          <cx:dataPt idx="3">
+            <cx:spPr>
+              <a:solidFill>
+                <a:srgbClr val="CFEFFD"/>
+              </a:solidFill>
+            </cx:spPr>
+          </cx:dataPt>
+          <cx:dataPt idx="4">
+            <cx:spPr>
+              <a:solidFill>
+                <a:srgbClr val="626971"/>
+              </a:solidFill>
+            </cx:spPr>
+          </cx:dataPt>
+          <cx:dataId val="0"/>
+        </cx:series>
+      </cx:plotAreaRegion>
+      <cx:axis id="0" hidden="1">
+        <cx:catScaling gapWidth="0.0599999987"/>
+        <cx:majorTickMarks type="cross"/>
+        <cx:minorTickMarks type="in"/>
+        <cx:tickLabels/>
+      </cx:axis>
+    </cx:plotArea>
+  </cx:chart>
+</cx:chartSpace>
+</file>
+
+<file path=ppt/charts/colors1.xml><?xml version="1.0" encoding="utf-8"?>
+<cs:colorStyle xmlns:cs="http://schemas.microsoft.com/office/drawing/2012/chartStyle" xmlns:a="http://schemas.openxmlformats.org/drawingml/2006/main" meth="cycle" id="10">
+  <a:schemeClr val="accent1"/>
+  <a:schemeClr val="accent2"/>
+  <a:schemeClr val="accent3"/>
+  <a:schemeClr val="accent4"/>
+  <a:schemeClr val="accent5"/>
+  <a:schemeClr val="accent6"/>
+  <cs:variation/>
+  <cs:variation>
+    <a:lumMod val="60000"/>
+  </cs:variation>
+  <cs:variation>
+    <a:lumMod val="80000"/>
+    <a:lumOff val="20000"/>
+  </cs:variation>
+  <cs:variation>
+    <a:lumMod val="80000"/>
+  </cs:variation>
+  <cs:variation>
+    <a:lumMod val="60000"/>
+    <a:lumOff val="40000"/>
+  </cs:variation>
+  <cs:variation>
+    <a:lumMod val="50000"/>
+  </cs:variation>
+  <cs:variation>
+    <a:lumMod val="70000"/>
+    <a:lumOff val="30000"/>
+  </cs:variation>
+  <cs:variation>
+    <a:lumMod val="70000"/>
+  </cs:variation>
+  <cs:variation>
+    <a:lumMod val="50000"/>
+    <a:lumOff val="50000"/>
+  </cs:variation>
+</cs:colorStyle>
+</file>
+
+<file path=ppt/charts/style1.xml><?xml version="1.0" encoding="utf-8"?>
+<cs:chartStyle xmlns:cs="http://schemas.microsoft.com/office/drawing/2012/chartStyle" xmlns:a="http://schemas.openxmlformats.org/drawingml/2006/main" id="419">
+  <cs:axisTitle>
+    <cs:lnRef idx="0"/>
+    <cs:fillRef idx="0"/>
+    <cs:effectRef idx="0"/>
+    <cs:fontRef idx="minor">
+      <a:schemeClr val="tx1">
+        <a:lumMod val="65000"/>
+        <a:lumOff val="35000"/>
+      </a:schemeClr>
+    </cs:fontRef>
+    <cs:defRPr sz="1197"/>
+  </cs:axisTitle>
+  <cs:categoryAxis>
+    <cs:lnRef idx="0"/>
+    <cs:fillRef idx="0"/>
+    <cs:effectRef idx="0"/>
+    <cs:fontRef idx="minor">
+      <a:schemeClr val="tx1">
+        <a:lumMod val="65000"/>
+        <a:lumOff val="35000"/>
+      </a:schemeClr>
+    </cs:fontRef>
+    <cs:spPr>
+      <a:ln w="9525" cap="flat" cmpd="sng" algn="ctr">
+        <a:solidFill>
+          <a:schemeClr val="tx1">
+            <a:lumMod val="15000"/>
+            <a:lumOff val="85000"/>
+          </a:schemeClr>
+        </a:solidFill>
+        <a:round/>
+      </a:ln>
+    </cs:spPr>
+    <cs:defRPr sz="1197"/>
+  </cs:categoryAxis>
+  <cs:chartArea mods="allowNoFillOverride allowNoLineOverride">
+    <cs:lnRef idx="0"/>
+    <cs:fillRef idx="0"/>
+    <cs:effectRef idx="0"/>
+    <cs:fontRef idx="minor">
+      <a:schemeClr val="tx1"/>
+    </cs:fontRef>
+    <cs:spPr>
+      <a:solidFill>
+        <a:schemeClr val="bg1"/>
+      </a:solidFill>
+      <a:ln w="9525" cap="flat" cmpd="sng" algn="ctr">
+        <a:solidFill>
+          <a:schemeClr val="tx1">
+            <a:lumMod val="15000"/>
+            <a:lumOff val="85000"/>
+          </a:schemeClr>
+        </a:solidFill>
+        <a:round/>
+      </a:ln>
+    </cs:spPr>
+    <cs:defRPr sz="1330"/>
+  </cs:chartArea>
+  <cs:dataLabel>
+    <cs:lnRef idx="0"/>
+    <cs:fillRef idx="0"/>
+    <cs:effectRef idx="0"/>
+    <cs:fontRef idx="minor">
+      <a:schemeClr val="tx1">
+        <a:lumMod val="65000"/>
+        <a:lumOff val="35000"/>
+      </a:schemeClr>
+    </cs:fontRef>
+    <cs:defRPr sz="1197"/>
+  </cs:dataLabel>
+  <cs:dataLabelCallout>
+    <cs:lnRef idx="0"/>
+    <cs:fillRef idx="0"/>
+    <cs:effectRef idx="0"/>
+    <cs:fontRef idx="minor">
+      <a:schemeClr val="dk1">
+        <a:lumMod val="65000"/>
+        <a:lumOff val="35000"/>
+      </a:schemeClr>
+    </cs:fontRef>
+    <cs:spPr>
+      <a:solidFill>
+        <a:schemeClr val="lt1"/>
+      </a:solidFill>
+      <a:ln>
+        <a:solidFill>
+          <a:schemeClr val="dk1">
+            <a:lumMod val="25000"/>
+            <a:lumOff val="75000"/>
+          </a:schemeClr>
+        </a:solidFill>
+      </a:ln>
+    </cs:spPr>
+    <cs:defRPr sz="1197"/>
+    <cs:bodyPr rot="0" spcFirstLastPara="1" vertOverflow="clip" horzOverflow="clip" vert="horz" wrap="square" lIns="36576" tIns="18288" rIns="36576" bIns="18288" anchor="ctr" anchorCtr="1">
+      <a:spAutoFit/>
+    </cs:bodyPr>
+  </cs:dataLabelCallout>
+  <cs:dataPoint>
+    <cs:lnRef idx="0"/>
+    <cs:fillRef idx="0">
+      <cs:styleClr val="auto"/>
+    </cs:fillRef>
+    <cs:effectRef idx="0"/>
+    <cs:fontRef idx="minor">
+      <a:schemeClr val="tx1"/>
+    </cs:fontRef>
+    <cs:spPr>
+      <a:solidFill>
+        <a:schemeClr val="phClr"/>
+      </a:solidFill>
+    </cs:spPr>
+  </cs:dataPoint>
+  <cs:dataPoint3D>
+    <cs:lnRef idx="0"/>
+    <cs:fillRef idx="0">
+      <cs:styleClr val="auto"/>
+    </cs:fillRef>
+    <cs:effectRef idx="0"/>
+    <cs:fontRef idx="minor">
+      <a:schemeClr val="tx1"/>
+    </cs:fontRef>
+    <cs:spPr>
+      <a:solidFill>
+        <a:schemeClr val="phClr"/>
+      </a:solidFill>
+    </cs:spPr>
+  </cs:dataPoint3D>
+  <cs:dataPointLine>
+    <cs:lnRef idx="0">
+      <cs:styleClr val="auto"/>
+    </cs:lnRef>
+    <cs:fillRef idx="0"/>
+    <cs:effectRef idx="0"/>
+    <cs:fontRef idx="minor">
+      <a:schemeClr val="tx1"/>
+    </cs:fontRef>
+    <cs:spPr>
+      <a:ln w="28575" cap="rnd">
+        <a:solidFill>
+          <a:schemeClr val="phClr"/>
+        </a:solidFill>
+        <a:round/>
+      </a:ln>
+    </cs:spPr>
+  </cs:dataPointLine>
+  <cs:dataPointMarker>
+    <cs:lnRef idx="0"/>
+    <cs:fillRef idx="0">
+      <cs:styleClr val="auto"/>
+    </cs:fillRef>
+    <cs:effectRef idx="0"/>
+    <cs:fontRef idx="minor">
+      <a:schemeClr val="tx1"/>
+    </cs:fontRef>
+    <cs:spPr>
+      <a:solidFill>
+        <a:schemeClr val="phClr"/>
+      </a:solidFill>
+      <a:ln w="9525">
+        <a:solidFill>
+          <a:schemeClr val="lt1"/>
+        </a:solidFill>
+      </a:ln>
+    </cs:spPr>
+  </cs:dataPointMarker>
+  <cs:dataPointMarkerLayout symbol="circle" size="5"/>
+  <cs:dataPointWireframe>
+    <cs:lnRef idx="0">
+      <cs:styleClr val="auto"/>
+    </cs:lnRef>
+    <cs:fillRef idx="0"/>
+    <cs:effectRef idx="0"/>
+    <cs:fontRef idx="minor">
+      <a:schemeClr val="tx1"/>
+    </cs:fontRef>
+    <cs:spPr>
+      <a:ln w="28575" cap="rnd">
+        <a:solidFill>
+          <a:schemeClr val="phClr"/>
+        </a:solidFill>
+        <a:round/>
+      </a:ln>
+    </cs:spPr>
+  </cs:dataPointWireframe>
+  <cs:dataTable>
+    <cs:lnRef idx="0"/>
+    <cs:fillRef idx="0"/>
+    <cs:effectRef idx="0"/>
+    <cs:fontRef idx="minor">
+      <a:schemeClr val="tx1">
+        <a:lumMod val="65000"/>
+        <a:lumOff val="35000"/>
+      </a:schemeClr>
+    </cs:fontRef>
+    <cs:spPr>
+      <a:ln w="9525">
+        <a:solidFill>
+          <a:schemeClr val="tx1">
+            <a:lumMod val="15000"/>
+            <a:lumOff val="85000"/>
+          </a:schemeClr>
+        </a:solidFill>
+      </a:ln>
+    </cs:spPr>
+    <cs:defRPr sz="1197"/>
+  </cs:dataTable>
+  <cs:downBar>
+    <cs:lnRef idx="0"/>
+    <cs:fillRef idx="0"/>
+    <cs:effectRef idx="0"/>
+    <cs:fontRef idx="minor">
+      <a:schemeClr val="dk1"/>
+    </cs:fontRef>
+    <cs:spPr>
+      <a:solidFill>
+        <a:schemeClr val="dk1">
+          <a:lumMod val="65000"/>
+          <a:lumOff val="35000"/>
+        </a:schemeClr>
+      </a:solidFill>
+      <a:ln w="9525">
+        <a:solidFill>
+          <a:schemeClr val="tx1">
+            <a:lumMod val="65000"/>
+            <a:lumOff val="35000"/>
+          </a:schemeClr>
+        </a:solidFill>
+      </a:ln>
+    </cs:spPr>
+  </cs:downBar>
+  <cs:dropLine>
+    <cs:lnRef idx="0"/>
+    <cs:fillRef idx="0"/>
+    <cs:effectRef idx="0"/>
+    <cs:fontRef idx="minor">
+      <a:schemeClr val="tx1"/>
+    </cs:fontRef>
+    <cs:spPr>
+      <a:ln w="9525" cap="flat" cmpd="sng" algn="ctr">
+        <a:solidFill>
+          <a:schemeClr val="tx1">
+            <a:lumMod val="35000"/>
+            <a:lumOff val="65000"/>
+          </a:schemeClr>
+        </a:solidFill>
+        <a:round/>
+      </a:ln>
+    </cs:spPr>
+  </cs:dropLine>
+  <cs:errorBar>
+    <cs:lnRef idx="0"/>
+    <cs:fillRef idx="0"/>
+    <cs:effectRef idx="0"/>
+    <cs:fontRef idx="minor">
+      <a:schemeClr val="tx1"/>
+    </cs:fontRef>
+    <cs:spPr>
+      <a:ln w="9525" cap="flat" cmpd="sng" algn="ctr">
+        <a:solidFill>
+          <a:schemeClr val="tx1">
+            <a:lumMod val="65000"/>
+            <a:lumOff val="35000"/>
+          </a:schemeClr>
+        </a:solidFill>
+        <a:round/>
+      </a:ln>
+    </cs:spPr>
+  </cs:errorBar>
+  <cs:floor>
+    <cs:lnRef idx="0"/>
+    <cs:fillRef idx="0"/>
+    <cs:effectRef idx="0"/>
+    <cs:fontRef idx="minor">
+      <a:schemeClr val="tx1"/>
+    </cs:fontRef>
+  </cs:floor>
+  <cs:gridlineMajor>
+    <cs:lnRef idx="0"/>
+    <cs:fillRef idx="0"/>
+    <cs:effectRef idx="0"/>
+    <cs:fontRef idx="minor">
+      <a:schemeClr val="tx1"/>
+    </cs:fontRef>
+    <cs:spPr>
+      <a:ln w="9525" cap="flat" cmpd="sng" algn="ctr">
+        <a:solidFill>
+          <a:schemeClr val="tx1">
+            <a:lumMod val="15000"/>
+            <a:lumOff val="85000"/>
+          </a:schemeClr>
+        </a:solidFill>
+        <a:round/>
+      </a:ln>
+    </cs:spPr>
+  </cs:gridlineMajor>
+  <cs:gridlineMinor>
+    <cs:lnRef idx="0"/>
+    <cs:fillRef idx="0"/>
+    <cs:effectRef idx="0"/>
+    <cs:fontRef idx="minor">
+      <a:schemeClr val="tx1"/>
+    </cs:fontRef>
+    <cs:spPr>
+      <a:ln w="9525" cap="flat" cmpd="sng" algn="ctr">
+        <a:solidFill>
+          <a:schemeClr val="tx1">
+            <a:lumMod val="15000"/>
+            <a:lumOff val="85000"/>
+          </a:schemeClr>
+        </a:solidFill>
+        <a:round/>
+      </a:ln>
+    </cs:spPr>
+  </cs:gridlineMinor>
+  <cs:hiLoLine>
+    <cs:lnRef idx="0"/>
+    <cs:fillRef idx="0"/>
+    <cs:effectRef idx="0"/>
+    <cs:fontRef idx="minor">
+      <a:schemeClr val="tx1"/>
+    </cs:fontRef>
+    <cs:spPr>
+      <a:ln w="9525" cap="flat" cmpd="sng" algn="ctr">
+        <a:solidFill>
+          <a:schemeClr val="tx1">
+            <a:lumMod val="75000"/>
+            <a:lumOff val="25000"/>
+          </a:schemeClr>
+        </a:solidFill>
+        <a:round/>
+      </a:ln>
+    </cs:spPr>
+  </cs:hiLoLine>
+  <cs:leaderLine>
+    <cs:lnRef idx="0"/>
+    <cs:fillRef idx="0"/>
+    <cs:effectRef idx="0"/>
+    <cs:fontRef idx="minor">
+      <a:schemeClr val="tx1"/>
+    </cs:fontRef>
+    <cs:spPr>
+      <a:ln w="9525" cap="flat" cmpd="sng" algn="ctr">
+        <a:solidFill>
+          <a:schemeClr val="tx1">
+            <a:lumMod val="35000"/>
+            <a:lumOff val="65000"/>
+          </a:schemeClr>
+        </a:solidFill>
+        <a:round/>
+      </a:ln>
+    </cs:spPr>
+  </cs:leaderLine>
+  <cs:legend>
+    <cs:lnRef idx="0"/>
+    <cs:fillRef idx="0"/>
+    <cs:effectRef idx="0"/>
+    <cs:fontRef idx="minor">
+      <a:schemeClr val="tx1">
+        <a:lumMod val="65000"/>
+        <a:lumOff val="35000"/>
+      </a:schemeClr>
+    </cs:fontRef>
+    <cs:defRPr sz="1197"/>
+  </cs:legend>
+  <cs:plotArea mods="allowNoFillOverride allowNoLineOverride">
+    <cs:lnRef idx="0"/>
+    <cs:fillRef idx="0"/>
+    <cs:effectRef idx="0"/>
+    <cs:fontRef idx="minor">
+      <a:schemeClr val="tx1"/>
+    </cs:fontRef>
+  </cs:plotArea>
+  <cs:plotArea3D mods="allowNoFillOverride allowNoLineOverride">
+    <cs:lnRef idx="0"/>
+    <cs:fillRef idx="0"/>
+    <cs:effectRef idx="0"/>
+    <cs:fontRef idx="minor">
+      <a:schemeClr val="tx1"/>
+    </cs:fontRef>
+  </cs:plotArea3D>
+  <cs:seriesAxis>
+    <cs:lnRef idx="0"/>
+    <cs:fillRef idx="0"/>
+    <cs:effectRef idx="0"/>
+    <cs:fontRef idx="minor">
+      <a:schemeClr val="tx1">
+        <a:lumMod val="65000"/>
+        <a:lumOff val="35000"/>
+      </a:schemeClr>
+    </cs:fontRef>
+    <cs:spPr>
+      <a:ln w="9525" cap="flat" cmpd="sng" algn="ctr">
+        <a:solidFill>
+          <a:schemeClr val="tx1">
+            <a:lumMod val="15000"/>
+            <a:lumOff val="85000"/>
+          </a:schemeClr>
+        </a:solidFill>
+        <a:round/>
+      </a:ln>
+    </cs:spPr>
+    <cs:defRPr sz="1197"/>
+  </cs:seriesAxis>
+  <cs:seriesLine>
+    <cs:lnRef idx="0"/>
+    <cs:fillRef idx="0"/>
+    <cs:effectRef idx="0"/>
+    <cs:fontRef idx="minor">
+      <a:schemeClr val="tx1"/>
+    </cs:fontRef>
+    <cs:spPr>
+      <a:ln w="9525" cap="flat">
+        <a:solidFill>
+          <a:srgbClr val="D9D9D9"/>
+        </a:solidFill>
+        <a:round/>
+      </a:ln>
+    </cs:spPr>
+  </cs:seriesLine>
+  <cs:title>
+    <cs:lnRef idx="0"/>
+    <cs:fillRef idx="0"/>
+    <cs:effectRef idx="0"/>
+    <cs:fontRef idx="minor">
+      <a:schemeClr val="tx1">
+        <a:lumMod val="65000"/>
+        <a:lumOff val="35000"/>
+      </a:schemeClr>
+    </cs:fontRef>
+    <cs:defRPr sz="1862"/>
+  </cs:title>
+  <cs:trendline>
+    <cs:lnRef idx="0">
+      <cs:styleClr val="auto"/>
+    </cs:lnRef>
+    <cs:fillRef idx="0"/>
+    <cs:effectRef idx="0"/>
+    <cs:fontRef idx="minor">
+      <a:schemeClr val="tx1"/>
+    </cs:fontRef>
+    <cs:spPr>
+      <a:ln w="19050" cap="rnd">
+        <a:solidFill>
+          <a:schemeClr val="phClr"/>
+        </a:solidFill>
+        <a:prstDash val="sysDash"/>
+      </a:ln>
+    </cs:spPr>
+  </cs:trendline>
+  <cs:trendlineLabel>
+    <cs:lnRef idx="0"/>
+    <cs:fillRef idx="0"/>
+    <cs:effectRef idx="0"/>
+    <cs:fontRef idx="minor">
+      <a:schemeClr val="tx1">
+        <a:lumMod val="65000"/>
+        <a:lumOff val="35000"/>
+      </a:schemeClr>
+    </cs:fontRef>
+    <cs:defRPr sz="1197"/>
+  </cs:trendlineLabel>
+  <cs:upBar>
+    <cs:lnRef idx="0"/>
+    <cs:fillRef idx="0"/>
+    <cs:effectRef idx="0"/>
+    <cs:fontRef idx="minor">
+      <a:schemeClr val="dk1"/>
+    </cs:fontRef>
+    <cs:spPr>
+      <a:solidFill>
+        <a:schemeClr val="lt1"/>
+      </a:solidFill>
+      <a:ln w="9525">
+        <a:solidFill>
+          <a:schemeClr val="tx1">
+            <a:lumMod val="15000"/>
+            <a:lumOff val="85000"/>
+          </a:schemeClr>
+        </a:solidFill>
+      </a:ln>
+    </cs:spPr>
+  </cs:upBar>
+  <cs:valueAxis>
+    <cs:lnRef idx="0"/>
+    <cs:fillRef idx="0"/>
+    <cs:effectRef idx="0"/>
+    <cs:fontRef idx="minor">
+      <a:schemeClr val="tx1">
+        <a:lumMod val="65000"/>
+        <a:lumOff val="35000"/>
+      </a:schemeClr>
+    </cs:fontRef>
+    <cs:defRPr sz="1197"/>
+  </cs:valueAxis>
+  <cs:wall>
+    <cs:lnRef idx="0"/>
+    <cs:fillRef idx="0"/>
+    <cs:effectRef idx="0"/>
+    <cs:fontRef idx="minor">
+      <a:schemeClr val="tx1"/>
+    </cs:fontRef>
+  </cs:wall>
+</cs:chartStyle>
+</file>
+
 <file path=ppt/slideLayouts/slideLayout1.xml><?xml version="1.0" encoding="utf-8"?>
 <p:sldLayout xmlns:a="http://schemas.openxmlformats.org/drawingml/2006/main" xmlns:r="http://schemas.openxmlformats.org/officeDocument/2006/relationships" xmlns:p="http://schemas.openxmlformats.org/presentationml/2006/main" type="title" preserve="1">
   <p:cSld name="Title Slide">
@@ -281,7 +919,7 @@
           <a:p>
             <a:fld id="{403CB87E-4591-47A1-9046-CF63F17215EF}" type="datetime2">
               <a:rPr lang="en-US" smtClean="0"/>
-              <a:t>Friday, January 21, 2022</a:t>
+              <a:t>Saturday, January 22, 2022</a:t>
             </a:fld>
             <a:endParaRPr lang="en-US" dirty="0"/>
           </a:p>
@@ -503,7 +1141,7 @@
           <a:p>
             <a:fld id="{2FA17F0E-8070-4DFE-A821-9A699EDBAD7E}" type="datetime2">
               <a:rPr lang="en-US" smtClean="0"/>
-              <a:t>Friday, January 21, 2022</a:t>
+              <a:t>Saturday, January 22, 2022</a:t>
             </a:fld>
             <a:endParaRPr lang="en-US"/>
           </a:p>
@@ -715,7 +1353,7 @@
           <a:p>
             <a:fld id="{D88D34AE-C7BF-46E5-A968-01C6641F6476}" type="datetime2">
               <a:rPr lang="en-US" smtClean="0"/>
-              <a:t>Friday, January 21, 2022</a:t>
+              <a:t>Saturday, January 22, 2022</a:t>
             </a:fld>
             <a:endParaRPr lang="en-US"/>
           </a:p>
@@ -956,7 +1594,7 @@
           <a:p>
             <a:fld id="{F33DE70B-B772-416E-A790-995760B1742E}" type="datetime2">
               <a:rPr lang="en-US" smtClean="0"/>
-              <a:t>Friday, January 21, 2022</a:t>
+              <a:t>Saturday, January 22, 2022</a:t>
             </a:fld>
             <a:endParaRPr lang="en-US" dirty="0"/>
           </a:p>
@@ -1255,7 +1893,7 @@
           <a:p>
             <a:fld id="{76760CDE-A6F1-4138-AF12-ED09E8E5FB6B}" type="datetime2">
               <a:rPr lang="en-US" smtClean="0"/>
-              <a:t>Friday, January 21, 2022</a:t>
+              <a:t>Saturday, January 22, 2022</a:t>
             </a:fld>
             <a:endParaRPr lang="en-US"/>
           </a:p>
@@ -1587,7 +2225,7 @@
           <a:p>
             <a:fld id="{DB15F8B1-DB7B-4D28-A97D-40FB2DD1EF78}" type="datetime2">
               <a:rPr lang="en-US" smtClean="0"/>
-              <a:t>Friday, January 21, 2022</a:t>
+              <a:t>Saturday, January 22, 2022</a:t>
             </a:fld>
             <a:endParaRPr lang="en-US"/>
           </a:p>
@@ -2033,7 +2671,7 @@
           <a:p>
             <a:fld id="{14039161-23B8-4738-9069-73EBE8884FDD}" type="datetime2">
               <a:rPr lang="en-US" smtClean="0"/>
-              <a:t>Friday, January 21, 2022</a:t>
+              <a:t>Saturday, January 22, 2022</a:t>
             </a:fld>
             <a:endParaRPr lang="en-US"/>
           </a:p>
@@ -2189,7 +2827,7 @@
           <a:p>
             <a:fld id="{FA994D44-7693-499F-AC6C-11696134FE3F}" type="datetime2">
               <a:rPr lang="en-US" smtClean="0"/>
-              <a:t>Friday, January 21, 2022</a:t>
+              <a:t>Saturday, January 22, 2022</a:t>
             </a:fld>
             <a:endParaRPr lang="en-US"/>
           </a:p>
@@ -2306,7 +2944,7 @@
           <a:p>
             <a:fld id="{363AF2AE-472C-4EF3-ABB2-24BAA9AE3CF7}" type="datetime2">
               <a:rPr lang="en-US" smtClean="0"/>
-              <a:t>Friday, January 21, 2022</a:t>
+              <a:t>Saturday, January 22, 2022</a:t>
             </a:fld>
             <a:endParaRPr lang="en-US"/>
           </a:p>
@@ -2633,7 +3271,7 @@
           <a:p>
             <a:fld id="{EAEA162C-A7C1-4263-9453-1BAFF8C39559}" type="datetime2">
               <a:rPr lang="en-US" smtClean="0"/>
-              <a:t>Friday, January 21, 2022</a:t>
+              <a:t>Saturday, January 22, 2022</a:t>
             </a:fld>
             <a:endParaRPr lang="en-US"/>
           </a:p>
@@ -2939,7 +3577,7 @@
           <a:p>
             <a:fld id="{64DF6793-3458-4587-8168-65F0C37A92D2}" type="datetime2">
               <a:rPr lang="en-US" smtClean="0"/>
-              <a:t>Friday, January 21, 2022</a:t>
+              <a:t>Saturday, January 22, 2022</a:t>
             </a:fld>
             <a:endParaRPr lang="en-US"/>
           </a:p>
@@ -3292,7 +3930,7 @@
             <a:fld id="{E8352ED3-3C46-4C9A-9738-67B2D875E7E2}" type="datetime2">
               <a:rPr lang="en-US" smtClean="0"/>
               <a:pPr/>
-              <a:t>Friday, January 21, 2022</a:t>
+              <a:t>Saturday, January 22, 2022</a:t>
             </a:fld>
             <a:endParaRPr lang="en-US" dirty="0"/>
           </a:p>
@@ -4207,6 +4845,27 @@
               <a:t> to Track Dynasty Fantasy Football Player Values</a:t>
             </a:r>
           </a:p>
+          <a:p>
+            <a:pPr algn="l"/>
+            <a:r>
+              <a:rPr lang="en-US" sz="1800" dirty="0">
+                <a:solidFill>
+                  <a:srgbClr val="626971"/>
+                </a:solidFill>
+                <a:latin typeface="Helvetica Neue Medium"/>
+              </a:rPr>
+              <a:t>Joshua Rio-Ross</a:t>
+            </a:r>
+          </a:p>
+          <a:p>
+            <a:pPr algn="l"/>
+            <a:endParaRPr lang="en-US" dirty="0">
+              <a:solidFill>
+                <a:srgbClr val="626971"/>
+              </a:solidFill>
+              <a:latin typeface="Helvetica Neue Medium"/>
+            </a:endParaRPr>
+          </a:p>
         </p:txBody>
       </p:sp>
       <p:pic>
@@ -4453,6 +5112,789 @@
     <p:extLst>
       <p:ext uri="{BB962C8B-B14F-4D97-AF65-F5344CB8AC3E}">
         <p14:creationId xmlns:p14="http://schemas.microsoft.com/office/powerpoint/2010/main" val="2806340548"/>
+      </p:ext>
+    </p:extLst>
+  </p:cSld>
+  <p:clrMapOvr>
+    <a:masterClrMapping/>
+  </p:clrMapOvr>
+</p:sld>
+</file>
+
+<file path=ppt/slides/slide10.xml><?xml version="1.0" encoding="utf-8"?>
+<p:sld xmlns:a="http://schemas.openxmlformats.org/drawingml/2006/main" xmlns:r="http://schemas.openxmlformats.org/officeDocument/2006/relationships" xmlns:p="http://schemas.openxmlformats.org/presentationml/2006/main">
+  <p:cSld>
+    <p:spTree>
+      <p:nvGrpSpPr>
+        <p:cNvPr id="1" name=""/>
+        <p:cNvGrpSpPr/>
+        <p:nvPr/>
+      </p:nvGrpSpPr>
+      <p:grpSpPr>
+        <a:xfrm>
+          <a:off x="0" y="0"/>
+          <a:ext cx="0" cy="0"/>
+          <a:chOff x="0" y="0"/>
+          <a:chExt cx="0" cy="0"/>
+        </a:xfrm>
+      </p:grpSpPr>
+      <p:sp useBgFill="1">
+        <p:nvSpPr>
+          <p:cNvPr id="28" name="Rectangle 27">
+            <a:extLst>
+              <a:ext uri="{FF2B5EF4-FFF2-40B4-BE49-F238E27FC236}">
+                <a16:creationId xmlns:a16="http://schemas.microsoft.com/office/drawing/2014/main" id="{E183CBD3-765E-49B4-B3A8-B29203D43C8F}"/>
+              </a:ext>
+              <a:ext uri="{C183D7F6-B498-43B3-948B-1728B52AA6E4}">
+                <adec:decorative xmlns:adec="http://schemas.microsoft.com/office/drawing/2017/decorative" val="1"/>
+              </a:ext>
+            </a:extLst>
+          </p:cNvPr>
+          <p:cNvSpPr>
+            <a:spLocks noGrp="1" noRot="1" noChangeAspect="1" noMove="1" noResize="1" noEditPoints="1" noAdjustHandles="1" noChangeArrowheads="1" noChangeShapeType="1" noTextEdit="1"/>
+          </p:cNvSpPr>
+          <p:nvPr>
+            <p:extLst>
+              <p:ext uri="{386F3935-93C4-4BCD-93E2-E3B085C9AB24}">
+                <p16:designElem xmlns:p16="http://schemas.microsoft.com/office/powerpoint/2015/main" val="1"/>
+              </p:ext>
+            </p:extLst>
+          </p:nvPr>
+        </p:nvSpPr>
+        <p:spPr>
+          <a:xfrm>
+            <a:off x="0" y="0"/>
+            <a:ext cx="12188952" cy="6858000"/>
+          </a:xfrm>
+          <a:prstGeom prst="rect">
+            <a:avLst/>
+          </a:prstGeom>
+          <a:ln>
+            <a:noFill/>
+          </a:ln>
+        </p:spPr>
+        <p:style>
+          <a:lnRef idx="2">
+            <a:schemeClr val="accent1">
+              <a:shade val="50000"/>
+            </a:schemeClr>
+          </a:lnRef>
+          <a:fillRef idx="1">
+            <a:schemeClr val="accent1"/>
+          </a:fillRef>
+          <a:effectRef idx="0">
+            <a:schemeClr val="accent1"/>
+          </a:effectRef>
+          <a:fontRef idx="minor">
+            <a:schemeClr val="lt1"/>
+          </a:fontRef>
+        </p:style>
+        <p:txBody>
+          <a:bodyPr rtlCol="0" anchor="ctr"/>
+          <a:lstStyle>
+            <a:defPPr>
+              <a:defRPr lang="en-US"/>
+            </a:defPPr>
+            <a:lvl1pPr marL="0" algn="l" defTabSz="914400" rtl="0" eaLnBrk="1" latinLnBrk="0" hangingPunct="1">
+              <a:defRPr sz="1800" kern="1200">
+                <a:solidFill>
+                  <a:schemeClr val="lt1"/>
+                </a:solidFill>
+                <a:latin typeface="+mn-lt"/>
+                <a:ea typeface="+mn-ea"/>
+                <a:cs typeface="+mn-cs"/>
+              </a:defRPr>
+            </a:lvl1pPr>
+            <a:lvl2pPr marL="457200" algn="l" defTabSz="914400" rtl="0" eaLnBrk="1" latinLnBrk="0" hangingPunct="1">
+              <a:defRPr sz="1800" kern="1200">
+                <a:solidFill>
+                  <a:schemeClr val="lt1"/>
+                </a:solidFill>
+                <a:latin typeface="+mn-lt"/>
+                <a:ea typeface="+mn-ea"/>
+                <a:cs typeface="+mn-cs"/>
+              </a:defRPr>
+            </a:lvl2pPr>
+            <a:lvl3pPr marL="914400" algn="l" defTabSz="914400" rtl="0" eaLnBrk="1" latinLnBrk="0" hangingPunct="1">
+              <a:defRPr sz="1800" kern="1200">
+                <a:solidFill>
+                  <a:schemeClr val="lt1"/>
+                </a:solidFill>
+                <a:latin typeface="+mn-lt"/>
+                <a:ea typeface="+mn-ea"/>
+                <a:cs typeface="+mn-cs"/>
+              </a:defRPr>
+            </a:lvl3pPr>
+            <a:lvl4pPr marL="1371600" algn="l" defTabSz="914400" rtl="0" eaLnBrk="1" latinLnBrk="0" hangingPunct="1">
+              <a:defRPr sz="1800" kern="1200">
+                <a:solidFill>
+                  <a:schemeClr val="lt1"/>
+                </a:solidFill>
+                <a:latin typeface="+mn-lt"/>
+                <a:ea typeface="+mn-ea"/>
+                <a:cs typeface="+mn-cs"/>
+              </a:defRPr>
+            </a:lvl4pPr>
+            <a:lvl5pPr marL="1828800" algn="l" defTabSz="914400" rtl="0" eaLnBrk="1" latinLnBrk="0" hangingPunct="1">
+              <a:defRPr sz="1800" kern="1200">
+                <a:solidFill>
+                  <a:schemeClr val="lt1"/>
+                </a:solidFill>
+                <a:latin typeface="+mn-lt"/>
+                <a:ea typeface="+mn-ea"/>
+                <a:cs typeface="+mn-cs"/>
+              </a:defRPr>
+            </a:lvl5pPr>
+            <a:lvl6pPr marL="2286000" algn="l" defTabSz="914400" rtl="0" eaLnBrk="1" latinLnBrk="0" hangingPunct="1">
+              <a:defRPr sz="1800" kern="1200">
+                <a:solidFill>
+                  <a:schemeClr val="lt1"/>
+                </a:solidFill>
+                <a:latin typeface="+mn-lt"/>
+                <a:ea typeface="+mn-ea"/>
+                <a:cs typeface="+mn-cs"/>
+              </a:defRPr>
+            </a:lvl6pPr>
+            <a:lvl7pPr marL="2743200" algn="l" defTabSz="914400" rtl="0" eaLnBrk="1" latinLnBrk="0" hangingPunct="1">
+              <a:defRPr sz="1800" kern="1200">
+                <a:solidFill>
+                  <a:schemeClr val="lt1"/>
+                </a:solidFill>
+                <a:latin typeface="+mn-lt"/>
+                <a:ea typeface="+mn-ea"/>
+                <a:cs typeface="+mn-cs"/>
+              </a:defRPr>
+            </a:lvl7pPr>
+            <a:lvl8pPr marL="3200400" algn="l" defTabSz="914400" rtl="0" eaLnBrk="1" latinLnBrk="0" hangingPunct="1">
+              <a:defRPr sz="1800" kern="1200">
+                <a:solidFill>
+                  <a:schemeClr val="lt1"/>
+                </a:solidFill>
+                <a:latin typeface="+mn-lt"/>
+                <a:ea typeface="+mn-ea"/>
+                <a:cs typeface="+mn-cs"/>
+              </a:defRPr>
+            </a:lvl8pPr>
+            <a:lvl9pPr marL="3657600" algn="l" defTabSz="914400" rtl="0" eaLnBrk="1" latinLnBrk="0" hangingPunct="1">
+              <a:defRPr sz="1800" kern="1200">
+                <a:solidFill>
+                  <a:schemeClr val="lt1"/>
+                </a:solidFill>
+                <a:latin typeface="+mn-lt"/>
+                <a:ea typeface="+mn-ea"/>
+                <a:cs typeface="+mn-cs"/>
+              </a:defRPr>
+            </a:lvl9pPr>
+          </a:lstStyle>
+          <a:p>
+            <a:pPr algn="ctr"/>
+            <a:endParaRPr lang="en-US" dirty="0"/>
+          </a:p>
+        </p:txBody>
+      </p:sp>
+      <p:sp>
+        <p:nvSpPr>
+          <p:cNvPr id="30" name="Rectangle 29">
+            <a:extLst>
+              <a:ext uri="{FF2B5EF4-FFF2-40B4-BE49-F238E27FC236}">
+                <a16:creationId xmlns:a16="http://schemas.microsoft.com/office/drawing/2014/main" id="{CF76C0B7-929F-44F9-9C4C-B0AD48DCB32F}"/>
+              </a:ext>
+              <a:ext uri="{C183D7F6-B498-43B3-948B-1728B52AA6E4}">
+                <adec:decorative xmlns:adec="http://schemas.microsoft.com/office/drawing/2017/decorative" val="1"/>
+              </a:ext>
+            </a:extLst>
+          </p:cNvPr>
+          <p:cNvSpPr>
+            <a:spLocks noGrp="1" noRot="1" noChangeAspect="1" noMove="1" noResize="1" noEditPoints="1" noAdjustHandles="1" noChangeArrowheads="1" noChangeShapeType="1" noTextEdit="1"/>
+          </p:cNvSpPr>
+          <p:nvPr>
+            <p:extLst>
+              <p:ext uri="{386F3935-93C4-4BCD-93E2-E3B085C9AB24}">
+                <p16:designElem xmlns:p16="http://schemas.microsoft.com/office/powerpoint/2015/main" val="1"/>
+              </p:ext>
+            </p:extLst>
+          </p:nvPr>
+        </p:nvSpPr>
+        <p:spPr>
+          <a:xfrm>
+            <a:off x="1524" y="0"/>
+            <a:ext cx="12188952" cy="6858000"/>
+          </a:xfrm>
+          <a:prstGeom prst="rect">
+            <a:avLst/>
+          </a:prstGeom>
+          <a:solidFill>
+            <a:schemeClr val="bg2">
+              <a:alpha val="35000"/>
+            </a:schemeClr>
+          </a:solidFill>
+          <a:ln>
+            <a:noFill/>
+          </a:ln>
+        </p:spPr>
+        <p:style>
+          <a:lnRef idx="2">
+            <a:schemeClr val="accent1">
+              <a:shade val="50000"/>
+            </a:schemeClr>
+          </a:lnRef>
+          <a:fillRef idx="1">
+            <a:schemeClr val="accent1"/>
+          </a:fillRef>
+          <a:effectRef idx="0">
+            <a:schemeClr val="accent1"/>
+          </a:effectRef>
+          <a:fontRef idx="minor">
+            <a:schemeClr val="lt1"/>
+          </a:fontRef>
+        </p:style>
+        <p:txBody>
+          <a:bodyPr rtlCol="0" anchor="ctr"/>
+          <a:lstStyle>
+            <a:defPPr>
+              <a:defRPr lang="en-US"/>
+            </a:defPPr>
+            <a:lvl1pPr marL="0" algn="l" defTabSz="914400" rtl="0" eaLnBrk="1" latinLnBrk="0" hangingPunct="1">
+              <a:defRPr sz="1800" kern="1200">
+                <a:solidFill>
+                  <a:schemeClr val="lt1"/>
+                </a:solidFill>
+                <a:latin typeface="+mn-lt"/>
+                <a:ea typeface="+mn-ea"/>
+                <a:cs typeface="+mn-cs"/>
+              </a:defRPr>
+            </a:lvl1pPr>
+            <a:lvl2pPr marL="457200" algn="l" defTabSz="914400" rtl="0" eaLnBrk="1" latinLnBrk="0" hangingPunct="1">
+              <a:defRPr sz="1800" kern="1200">
+                <a:solidFill>
+                  <a:schemeClr val="lt1"/>
+                </a:solidFill>
+                <a:latin typeface="+mn-lt"/>
+                <a:ea typeface="+mn-ea"/>
+                <a:cs typeface="+mn-cs"/>
+              </a:defRPr>
+            </a:lvl2pPr>
+            <a:lvl3pPr marL="914400" algn="l" defTabSz="914400" rtl="0" eaLnBrk="1" latinLnBrk="0" hangingPunct="1">
+              <a:defRPr sz="1800" kern="1200">
+                <a:solidFill>
+                  <a:schemeClr val="lt1"/>
+                </a:solidFill>
+                <a:latin typeface="+mn-lt"/>
+                <a:ea typeface="+mn-ea"/>
+                <a:cs typeface="+mn-cs"/>
+              </a:defRPr>
+            </a:lvl3pPr>
+            <a:lvl4pPr marL="1371600" algn="l" defTabSz="914400" rtl="0" eaLnBrk="1" latinLnBrk="0" hangingPunct="1">
+              <a:defRPr sz="1800" kern="1200">
+                <a:solidFill>
+                  <a:schemeClr val="lt1"/>
+                </a:solidFill>
+                <a:latin typeface="+mn-lt"/>
+                <a:ea typeface="+mn-ea"/>
+                <a:cs typeface="+mn-cs"/>
+              </a:defRPr>
+            </a:lvl4pPr>
+            <a:lvl5pPr marL="1828800" algn="l" defTabSz="914400" rtl="0" eaLnBrk="1" latinLnBrk="0" hangingPunct="1">
+              <a:defRPr sz="1800" kern="1200">
+                <a:solidFill>
+                  <a:schemeClr val="lt1"/>
+                </a:solidFill>
+                <a:latin typeface="+mn-lt"/>
+                <a:ea typeface="+mn-ea"/>
+                <a:cs typeface="+mn-cs"/>
+              </a:defRPr>
+            </a:lvl5pPr>
+            <a:lvl6pPr marL="2286000" algn="l" defTabSz="914400" rtl="0" eaLnBrk="1" latinLnBrk="0" hangingPunct="1">
+              <a:defRPr sz="1800" kern="1200">
+                <a:solidFill>
+                  <a:schemeClr val="lt1"/>
+                </a:solidFill>
+                <a:latin typeface="+mn-lt"/>
+                <a:ea typeface="+mn-ea"/>
+                <a:cs typeface="+mn-cs"/>
+              </a:defRPr>
+            </a:lvl6pPr>
+            <a:lvl7pPr marL="2743200" algn="l" defTabSz="914400" rtl="0" eaLnBrk="1" latinLnBrk="0" hangingPunct="1">
+              <a:defRPr sz="1800" kern="1200">
+                <a:solidFill>
+                  <a:schemeClr val="lt1"/>
+                </a:solidFill>
+                <a:latin typeface="+mn-lt"/>
+                <a:ea typeface="+mn-ea"/>
+                <a:cs typeface="+mn-cs"/>
+              </a:defRPr>
+            </a:lvl7pPr>
+            <a:lvl8pPr marL="3200400" algn="l" defTabSz="914400" rtl="0" eaLnBrk="1" latinLnBrk="0" hangingPunct="1">
+              <a:defRPr sz="1800" kern="1200">
+                <a:solidFill>
+                  <a:schemeClr val="lt1"/>
+                </a:solidFill>
+                <a:latin typeface="+mn-lt"/>
+                <a:ea typeface="+mn-ea"/>
+                <a:cs typeface="+mn-cs"/>
+              </a:defRPr>
+            </a:lvl8pPr>
+            <a:lvl9pPr marL="3657600" algn="l" defTabSz="914400" rtl="0" eaLnBrk="1" latinLnBrk="0" hangingPunct="1">
+              <a:defRPr sz="1800" kern="1200">
+                <a:solidFill>
+                  <a:schemeClr val="lt1"/>
+                </a:solidFill>
+                <a:latin typeface="+mn-lt"/>
+                <a:ea typeface="+mn-ea"/>
+                <a:cs typeface="+mn-cs"/>
+              </a:defRPr>
+            </a:lvl9pPr>
+          </a:lstStyle>
+          <a:p>
+            <a:pPr algn="ctr"/>
+            <a:endParaRPr lang="en-US" dirty="0"/>
+          </a:p>
+        </p:txBody>
+      </p:sp>
+      <p:sp>
+        <p:nvSpPr>
+          <p:cNvPr id="32" name="Rectangle 31">
+            <a:extLst>
+              <a:ext uri="{FF2B5EF4-FFF2-40B4-BE49-F238E27FC236}">
+                <a16:creationId xmlns:a16="http://schemas.microsoft.com/office/drawing/2014/main" id="{A567A692-E165-4BCD-842C-A9081974A9F8}"/>
+              </a:ext>
+              <a:ext uri="{C183D7F6-B498-43B3-948B-1728B52AA6E4}">
+                <adec:decorative xmlns:adec="http://schemas.microsoft.com/office/drawing/2017/decorative" val="1"/>
+              </a:ext>
+            </a:extLst>
+          </p:cNvPr>
+          <p:cNvSpPr>
+            <a:spLocks noGrp="1" noRot="1" noChangeAspect="1" noMove="1" noResize="1" noEditPoints="1" noAdjustHandles="1" noChangeArrowheads="1" noChangeShapeType="1" noTextEdit="1"/>
+          </p:cNvSpPr>
+          <p:nvPr>
+            <p:extLst>
+              <p:ext uri="{386F3935-93C4-4BCD-93E2-E3B085C9AB24}">
+                <p16:designElem xmlns:p16="http://schemas.microsoft.com/office/powerpoint/2015/main" val="1"/>
+              </p:ext>
+            </p:extLst>
+          </p:nvPr>
+        </p:nvSpPr>
+        <p:spPr>
+          <a:xfrm>
+            <a:off x="1446276" y="685800"/>
+            <a:ext cx="10744200" cy="5486400"/>
+          </a:xfrm>
+          <a:prstGeom prst="rect">
+            <a:avLst/>
+          </a:prstGeom>
+          <a:solidFill>
+            <a:schemeClr val="bg1"/>
+          </a:solidFill>
+          <a:ln>
+            <a:noFill/>
+          </a:ln>
+        </p:spPr>
+        <p:style>
+          <a:lnRef idx="2">
+            <a:schemeClr val="accent1">
+              <a:shade val="50000"/>
+            </a:schemeClr>
+          </a:lnRef>
+          <a:fillRef idx="1">
+            <a:schemeClr val="accent1"/>
+          </a:fillRef>
+          <a:effectRef idx="0">
+            <a:schemeClr val="accent1"/>
+          </a:effectRef>
+          <a:fontRef idx="minor">
+            <a:schemeClr val="lt1"/>
+          </a:fontRef>
+        </p:style>
+        <p:txBody>
+          <a:bodyPr rtlCol="0" anchor="ctr"/>
+          <a:lstStyle/>
+          <a:p>
+            <a:pPr algn="ctr"/>
+            <a:endParaRPr lang="en-US"/>
+          </a:p>
+        </p:txBody>
+      </p:sp>
+      <p:sp>
+        <p:nvSpPr>
+          <p:cNvPr id="34" name="Rectangle 33">
+            <a:extLst>
+              <a:ext uri="{FF2B5EF4-FFF2-40B4-BE49-F238E27FC236}">
+                <a16:creationId xmlns:a16="http://schemas.microsoft.com/office/drawing/2014/main" id="{20616EB7-E723-4BF0-AC20-B8CD75A4FC12}"/>
+              </a:ext>
+              <a:ext uri="{C183D7F6-B498-43B3-948B-1728B52AA6E4}">
+                <adec:decorative xmlns:adec="http://schemas.microsoft.com/office/drawing/2017/decorative" val="1"/>
+              </a:ext>
+            </a:extLst>
+          </p:cNvPr>
+          <p:cNvSpPr>
+            <a:spLocks noGrp="1" noRot="1" noChangeAspect="1" noMove="1" noResize="1" noEditPoints="1" noAdjustHandles="1" noChangeArrowheads="1" noChangeShapeType="1" noTextEdit="1"/>
+          </p:cNvSpPr>
+          <p:nvPr>
+            <p:extLst>
+              <p:ext uri="{386F3935-93C4-4BCD-93E2-E3B085C9AB24}">
+                <p16:designElem xmlns:p16="http://schemas.microsoft.com/office/powerpoint/2015/main" val="1"/>
+              </p:ext>
+            </p:extLst>
+          </p:nvPr>
+        </p:nvSpPr>
+        <p:spPr>
+          <a:xfrm rot="10800000">
+            <a:off x="11496180" y="680188"/>
+            <a:ext cx="695819" cy="5486399"/>
+          </a:xfrm>
+          <a:prstGeom prst="rect">
+            <a:avLst/>
+          </a:prstGeom>
+          <a:solidFill>
+            <a:srgbClr val="3FC1F8">
+              <a:alpha val="25000"/>
+            </a:srgbClr>
+          </a:solidFill>
+          <a:ln w="25400" cap="flat">
+            <a:noFill/>
+            <a:prstDash val="solid"/>
+            <a:round/>
+          </a:ln>
+          <a:effectLst/>
+          <a:sp3d/>
+        </p:spPr>
+        <p:style>
+          <a:lnRef idx="0">
+            <a:scrgbClr r="0" g="0" b="0"/>
+          </a:lnRef>
+          <a:fillRef idx="0">
+            <a:scrgbClr r="0" g="0" b="0"/>
+          </a:fillRef>
+          <a:effectRef idx="0">
+            <a:scrgbClr r="0" g="0" b="0"/>
+          </a:effectRef>
+          <a:fontRef idx="none"/>
+        </p:style>
+        <p:txBody>
+          <a:bodyPr rot="0" spcFirstLastPara="1" vertOverflow="overflow" horzOverflow="overflow" vert="horz" wrap="square" lIns="0" tIns="0" rIns="0" bIns="0" numCol="1" spcCol="38100" rtlCol="0" anchor="ctr">
+            <a:spAutoFit/>
+          </a:bodyPr>
+          <a:lstStyle/>
+          <a:p>
+            <a:pPr marL="0" marR="0" indent="0" algn="ctr" defTabSz="825500" rtl="0" fontAlgn="auto" latinLnBrk="0" hangingPunct="0">
+              <a:lnSpc>
+                <a:spcPct val="100000"/>
+              </a:lnSpc>
+              <a:spcBef>
+                <a:spcPts val="0"/>
+              </a:spcBef>
+              <a:spcAft>
+                <a:spcPts val="0"/>
+              </a:spcAft>
+              <a:buClrTx/>
+              <a:buSzTx/>
+              <a:buFontTx/>
+              <a:buNone/>
+              <a:tabLst/>
+            </a:pPr>
+            <a:endParaRPr kumimoji="0" lang="en-US" sz="3000" b="0" i="0" u="none" strike="noStrike" cap="none" spc="0" normalizeH="0" baseline="0">
+              <a:ln>
+                <a:noFill/>
+              </a:ln>
+              <a:solidFill>
+                <a:srgbClr val="000000"/>
+              </a:solidFill>
+              <a:effectLst/>
+              <a:uFillTx/>
+              <a:latin typeface="Helvetica Neue Medium"/>
+              <a:ea typeface="Helvetica Neue Medium"/>
+              <a:cs typeface="Helvetica Neue Medium"/>
+              <a:sym typeface="Helvetica Neue Medium"/>
+            </a:endParaRPr>
+          </a:p>
+        </p:txBody>
+      </p:sp>
+      <p:cxnSp>
+        <p:nvCxnSpPr>
+          <p:cNvPr id="36" name="Straight Connector 35">
+            <a:extLst>
+              <a:ext uri="{FF2B5EF4-FFF2-40B4-BE49-F238E27FC236}">
+                <a16:creationId xmlns:a16="http://schemas.microsoft.com/office/drawing/2014/main" id="{35D3937F-89B8-4A4C-BA42-C663D9B6C8E3}"/>
+              </a:ext>
+              <a:ext uri="{C183D7F6-B498-43B3-948B-1728B52AA6E4}">
+                <adec:decorative xmlns:adec="http://schemas.microsoft.com/office/drawing/2017/decorative" val="1"/>
+              </a:ext>
+            </a:extLst>
+          </p:cNvPr>
+          <p:cNvCxnSpPr>
+            <a:cxnSpLocks noGrp="1" noRot="1" noChangeAspect="1" noMove="1" noResize="1" noEditPoints="1" noAdjustHandles="1" noChangeArrowheads="1" noChangeShapeType="1"/>
+          </p:cNvCxnSpPr>
+          <p:nvPr>
+            <p:extLst>
+              <p:ext uri="{386F3935-93C4-4BCD-93E2-E3B085C9AB24}">
+                <p16:designElem xmlns:p16="http://schemas.microsoft.com/office/powerpoint/2015/main" val="1"/>
+              </p:ext>
+            </p:extLst>
+          </p:nvPr>
+        </p:nvCxnSpPr>
+        <p:spPr>
+          <a:xfrm flipV="1">
+            <a:off x="11496184" y="5610"/>
+            <a:ext cx="0" cy="6858000"/>
+          </a:xfrm>
+          <a:prstGeom prst="line">
+            <a:avLst/>
+          </a:prstGeom>
+          <a:ln w="9525" cap="rnd">
+            <a:solidFill>
+              <a:srgbClr val="3FC1F8"/>
+            </a:solidFill>
+            <a:prstDash val="dash"/>
+          </a:ln>
+        </p:spPr>
+        <p:style>
+          <a:lnRef idx="1">
+            <a:schemeClr val="accent1"/>
+          </a:lnRef>
+          <a:fillRef idx="0">
+            <a:schemeClr val="accent1"/>
+          </a:fillRef>
+          <a:effectRef idx="0">
+            <a:schemeClr val="accent1"/>
+          </a:effectRef>
+          <a:fontRef idx="minor">
+            <a:schemeClr val="tx1"/>
+          </a:fontRef>
+        </p:style>
+      </p:cxnSp>
+      <p:cxnSp>
+        <p:nvCxnSpPr>
+          <p:cNvPr id="38" name="Straight Connector 37">
+            <a:extLst>
+              <a:ext uri="{FF2B5EF4-FFF2-40B4-BE49-F238E27FC236}">
+                <a16:creationId xmlns:a16="http://schemas.microsoft.com/office/drawing/2014/main" id="{F04C3AED-6D36-45C0-95CD-A7378D9DD6C3}"/>
+              </a:ext>
+              <a:ext uri="{C183D7F6-B498-43B3-948B-1728B52AA6E4}">
+                <adec:decorative xmlns:adec="http://schemas.microsoft.com/office/drawing/2017/decorative" val="1"/>
+              </a:ext>
+            </a:extLst>
+          </p:cNvPr>
+          <p:cNvCxnSpPr>
+            <a:cxnSpLocks noGrp="1" noRot="1" noChangeAspect="1" noMove="1" noResize="1" noEditPoints="1" noAdjustHandles="1" noChangeArrowheads="1" noChangeShapeType="1"/>
+          </p:cNvCxnSpPr>
+          <p:nvPr>
+            <p:extLst>
+              <p:ext uri="{386F3935-93C4-4BCD-93E2-E3B085C9AB24}">
+                <p16:designElem xmlns:p16="http://schemas.microsoft.com/office/powerpoint/2015/main" val="1"/>
+              </p:ext>
+            </p:extLst>
+          </p:nvPr>
+        </p:nvCxnSpPr>
+        <p:spPr>
+          <a:xfrm>
+            <a:off x="1524" y="6172200"/>
+            <a:ext cx="12192000" cy="0"/>
+          </a:xfrm>
+          <a:prstGeom prst="line">
+            <a:avLst/>
+          </a:prstGeom>
+          <a:solidFill>
+            <a:srgbClr val="3FC1F8"/>
+          </a:solidFill>
+          <a:ln w="9525" cap="rnd">
+            <a:solidFill>
+              <a:schemeClr val="accent1"/>
+            </a:solidFill>
+            <a:prstDash val="dash"/>
+          </a:ln>
+        </p:spPr>
+        <p:style>
+          <a:lnRef idx="1">
+            <a:schemeClr val="accent1"/>
+          </a:lnRef>
+          <a:fillRef idx="0">
+            <a:schemeClr val="accent1"/>
+          </a:fillRef>
+          <a:effectRef idx="0">
+            <a:schemeClr val="accent1"/>
+          </a:effectRef>
+          <a:fontRef idx="minor">
+            <a:schemeClr val="tx1"/>
+          </a:fontRef>
+        </p:style>
+      </p:cxnSp>
+      <p:pic>
+        <p:nvPicPr>
+          <p:cNvPr id="6" name="Picture 5" descr="A picture containing shape&#10;&#10;Description automatically generated">
+            <a:extLst>
+              <a:ext uri="{FF2B5EF4-FFF2-40B4-BE49-F238E27FC236}">
+                <a16:creationId xmlns:a16="http://schemas.microsoft.com/office/drawing/2014/main" id="{154CBE51-93AD-41C7-9776-41EB07A4D13B}"/>
+              </a:ext>
+            </a:extLst>
+          </p:cNvPr>
+          <p:cNvPicPr>
+            <a:picLocks noChangeAspect="1"/>
+          </p:cNvPicPr>
+          <p:nvPr/>
+        </p:nvPicPr>
+        <p:blipFill>
+          <a:blip r:embed="rId2">
+            <a:extLst>
+              <a:ext uri="{28A0092B-C50C-407E-A947-70E740481C1C}">
+                <a14:useLocalDpi xmlns:a14="http://schemas.microsoft.com/office/drawing/2010/main" val="0"/>
+              </a:ext>
+            </a:extLst>
+          </a:blip>
+          <a:stretch>
+            <a:fillRect/>
+          </a:stretch>
+        </p:blipFill>
+        <p:spPr>
+          <a:xfrm>
+            <a:off x="11560631" y="6212844"/>
+            <a:ext cx="628320" cy="628320"/>
+          </a:xfrm>
+          <a:prstGeom prst="rect">
+            <a:avLst/>
+          </a:prstGeom>
+        </p:spPr>
+      </p:pic>
+      <p:sp>
+        <p:nvSpPr>
+          <p:cNvPr id="19" name="Title 1">
+            <a:extLst>
+              <a:ext uri="{FF2B5EF4-FFF2-40B4-BE49-F238E27FC236}">
+                <a16:creationId xmlns:a16="http://schemas.microsoft.com/office/drawing/2014/main" id="{EA9A5F1F-098B-407D-8466-39E797E06AD4}"/>
+              </a:ext>
+            </a:extLst>
+          </p:cNvPr>
+          <p:cNvSpPr txBox="1">
+            <a:spLocks/>
+          </p:cNvSpPr>
+          <p:nvPr/>
+        </p:nvSpPr>
+        <p:spPr>
+          <a:xfrm>
+            <a:off x="422899" y="576263"/>
+            <a:ext cx="5616236" cy="2967606"/>
+          </a:xfrm>
+          <a:prstGeom prst="rect">
+            <a:avLst/>
+          </a:prstGeom>
+        </p:spPr>
+        <p:txBody>
+          <a:bodyPr vert="horz" lIns="91440" tIns="45720" rIns="91440" bIns="45720" rtlCol="0" anchor="b">
+            <a:normAutofit/>
+          </a:bodyPr>
+          <a:lstStyle>
+            <a:lvl1pPr algn="ctr" defTabSz="914400" rtl="0" eaLnBrk="1" latinLnBrk="0" hangingPunct="1">
+              <a:lnSpc>
+                <a:spcPct val="90000"/>
+              </a:lnSpc>
+              <a:spcBef>
+                <a:spcPct val="0"/>
+              </a:spcBef>
+              <a:buNone/>
+              <a:defRPr sz="5200" kern="1200">
+                <a:solidFill>
+                  <a:schemeClr val="tx2"/>
+                </a:solidFill>
+                <a:latin typeface="+mj-lt"/>
+                <a:ea typeface="+mj-ea"/>
+                <a:cs typeface="+mj-cs"/>
+              </a:defRPr>
+            </a:lvl1pPr>
+          </a:lstStyle>
+          <a:p>
+            <a:pPr algn="l"/>
+            <a:r>
+              <a:rPr lang="en-US" sz="4800" dirty="0">
+                <a:solidFill>
+                  <a:srgbClr val="626971"/>
+                </a:solidFill>
+                <a:latin typeface="Helvetica Neue Medium"/>
+              </a:rPr>
+              <a:t>Focus</a:t>
+            </a:r>
+          </a:p>
+        </p:txBody>
+      </p:sp>
+      <p:sp>
+        <p:nvSpPr>
+          <p:cNvPr id="21" name="Subtitle 2">
+            <a:extLst>
+              <a:ext uri="{FF2B5EF4-FFF2-40B4-BE49-F238E27FC236}">
+                <a16:creationId xmlns:a16="http://schemas.microsoft.com/office/drawing/2014/main" id="{F1FDC1FB-79A0-46DC-B541-B8C2AEFA0BF6}"/>
+              </a:ext>
+            </a:extLst>
+          </p:cNvPr>
+          <p:cNvSpPr>
+            <a:spLocks noGrp="1"/>
+          </p:cNvSpPr>
+          <p:nvPr>
+            <p:ph type="subTitle" idx="1"/>
+          </p:nvPr>
+        </p:nvSpPr>
+        <p:spPr>
+          <a:xfrm>
+            <a:off x="422899" y="3764975"/>
+            <a:ext cx="3613392" cy="2192683"/>
+          </a:xfrm>
+        </p:spPr>
+        <p:txBody>
+          <a:bodyPr>
+            <a:normAutofit/>
+          </a:bodyPr>
+          <a:lstStyle/>
+          <a:p>
+            <a:pPr algn="l"/>
+            <a:r>
+              <a:rPr lang="en-US" dirty="0">
+                <a:solidFill>
+                  <a:srgbClr val="626971"/>
+                </a:solidFill>
+                <a:latin typeface="Helvetica Neue Medium"/>
+              </a:rPr>
+              <a:t>King (Derrick) Henry</a:t>
+            </a:r>
+          </a:p>
+        </p:txBody>
+      </p:sp>
+      <p:pic>
+        <p:nvPicPr>
+          <p:cNvPr id="3" name="Picture 2" descr="A person in a garment&#10;&#10;Description automatically generated with low confidence">
+            <a:extLst>
+              <a:ext uri="{FF2B5EF4-FFF2-40B4-BE49-F238E27FC236}">
+                <a16:creationId xmlns:a16="http://schemas.microsoft.com/office/drawing/2014/main" id="{AD9210B8-3343-4BF4-AD10-D3E935049242}"/>
+              </a:ext>
+            </a:extLst>
+          </p:cNvPr>
+          <p:cNvPicPr>
+            <a:picLocks noChangeAspect="1"/>
+          </p:cNvPicPr>
+          <p:nvPr/>
+        </p:nvPicPr>
+        <p:blipFill>
+          <a:blip r:embed="rId3">
+            <a:extLst>
+              <a:ext uri="{28A0092B-C50C-407E-A947-70E740481C1C}">
+                <a14:useLocalDpi xmlns:a14="http://schemas.microsoft.com/office/drawing/2010/main" val="0"/>
+              </a:ext>
+            </a:extLst>
+          </a:blip>
+          <a:stretch>
+            <a:fillRect/>
+          </a:stretch>
+        </p:blipFill>
+        <p:spPr>
+          <a:xfrm>
+            <a:off x="7713368" y="680187"/>
+            <a:ext cx="2700338" cy="5486400"/>
+          </a:xfrm>
+          <a:prstGeom prst="rect">
+            <a:avLst/>
+          </a:prstGeom>
+        </p:spPr>
+      </p:pic>
+    </p:spTree>
+    <p:extLst>
+      <p:ext uri="{BB962C8B-B14F-4D97-AF65-F5344CB8AC3E}">
+        <p14:creationId xmlns:p14="http://schemas.microsoft.com/office/powerpoint/2010/main" val="801875954"/>
       </p:ext>
     </p:extLst>
   </p:cSld>
@@ -6162,6 +7604,9 @@
           <a:prstGeom prst="downArrow">
             <a:avLst/>
           </a:prstGeom>
+          <a:solidFill>
+            <a:srgbClr val="E5505C"/>
+          </a:solidFill>
         </p:spPr>
         <p:style>
           <a:lnRef idx="2">
@@ -6937,10 +8382,10 @@
       </p:pic>
       <p:pic>
         <p:nvPicPr>
-          <p:cNvPr id="3" name="Picture 2" descr="Graphical user interface, application&#10;&#10;Description automatically generated">
-            <a:extLst>
-              <a:ext uri="{FF2B5EF4-FFF2-40B4-BE49-F238E27FC236}">
-                <a16:creationId xmlns:a16="http://schemas.microsoft.com/office/drawing/2014/main" id="{632F38AD-C9FB-45F9-9964-D3EBF77D3C94}"/>
+          <p:cNvPr id="3" name="Picture 2" descr="A picture containing text, computer, computer, screenshot&#10;&#10;Description automatically generated">
+            <a:extLst>
+              <a:ext uri="{FF2B5EF4-FFF2-40B4-BE49-F238E27FC236}">
+                <a16:creationId xmlns:a16="http://schemas.microsoft.com/office/drawing/2014/main" id="{9F17CAAE-6184-401A-8EF9-5241112AA74E}"/>
               </a:ext>
             </a:extLst>
           </p:cNvPr>
@@ -6963,8 +8408,8 @@
         </p:blipFill>
         <p:spPr>
           <a:xfrm>
-            <a:off x="1443228" y="136228"/>
-            <a:ext cx="9895517" cy="4501083"/>
+            <a:off x="1457157" y="95356"/>
+            <a:ext cx="9970835" cy="4762971"/>
           </a:xfrm>
           <a:prstGeom prst="rect">
             <a:avLst/>
@@ -6974,7 +8419,7 @@
     </p:spTree>
     <p:extLst>
       <p:ext uri="{BB962C8B-B14F-4D97-AF65-F5344CB8AC3E}">
-        <p14:creationId xmlns:p14="http://schemas.microsoft.com/office/powerpoint/2010/main" val="1655239444"/>
+        <p14:creationId xmlns:p14="http://schemas.microsoft.com/office/powerpoint/2010/main" val="1308254507"/>
       </p:ext>
     </p:extLst>
   </p:cSld>
@@ -7720,10 +9165,10 @@
       </p:pic>
       <p:pic>
         <p:nvPicPr>
-          <p:cNvPr id="4" name="Picture 3" descr="Graphical user interface, application&#10;&#10;Description automatically generated">
-            <a:extLst>
-              <a:ext uri="{FF2B5EF4-FFF2-40B4-BE49-F238E27FC236}">
-                <a16:creationId xmlns:a16="http://schemas.microsoft.com/office/drawing/2014/main" id="{55BF028A-C266-4378-85D0-D8FF37BB525A}"/>
+          <p:cNvPr id="3" name="Picture 2" descr="Graphical user interface, application&#10;&#10;Description automatically generated">
+            <a:extLst>
+              <a:ext uri="{FF2B5EF4-FFF2-40B4-BE49-F238E27FC236}">
+                <a16:creationId xmlns:a16="http://schemas.microsoft.com/office/drawing/2014/main" id="{632F38AD-C9FB-45F9-9964-D3EBF77D3C94}"/>
               </a:ext>
             </a:extLst>
           </p:cNvPr>
@@ -7746,8 +9191,8 @@
         </p:blipFill>
         <p:spPr>
           <a:xfrm>
-            <a:off x="1346844" y="157644"/>
-            <a:ext cx="9991901" cy="4479667"/>
+            <a:off x="1443228" y="136228"/>
+            <a:ext cx="9895517" cy="4501083"/>
           </a:xfrm>
           <a:prstGeom prst="rect">
             <a:avLst/>
@@ -7757,7 +9202,7 @@
     </p:spTree>
     <p:extLst>
       <p:ext uri="{BB962C8B-B14F-4D97-AF65-F5344CB8AC3E}">
-        <p14:creationId xmlns:p14="http://schemas.microsoft.com/office/powerpoint/2010/main" val="2871878040"/>
+        <p14:creationId xmlns:p14="http://schemas.microsoft.com/office/powerpoint/2010/main" val="1655239444"/>
       </p:ext>
     </p:extLst>
   </p:cSld>
@@ -8503,10 +9948,10 @@
       </p:pic>
       <p:pic>
         <p:nvPicPr>
-          <p:cNvPr id="7" name="Picture 6" descr="Chart, scatter chart&#10;&#10;Description automatically generated">
-            <a:extLst>
-              <a:ext uri="{FF2B5EF4-FFF2-40B4-BE49-F238E27FC236}">
-                <a16:creationId xmlns:a16="http://schemas.microsoft.com/office/drawing/2014/main" id="{726E6772-2F5F-4AB1-B59E-8C11FAEDF9FE}"/>
+          <p:cNvPr id="4" name="Picture 3" descr="Graphical user interface, application&#10;&#10;Description automatically generated">
+            <a:extLst>
+              <a:ext uri="{FF2B5EF4-FFF2-40B4-BE49-F238E27FC236}">
+                <a16:creationId xmlns:a16="http://schemas.microsoft.com/office/drawing/2014/main" id="{55BF028A-C266-4378-85D0-D8FF37BB525A}"/>
               </a:ext>
             </a:extLst>
           </p:cNvPr>
@@ -8529,8 +9974,8 @@
         </p:blipFill>
         <p:spPr>
           <a:xfrm>
-            <a:off x="921829" y="81555"/>
-            <a:ext cx="10571303" cy="2967606"/>
+            <a:off x="1346844" y="157644"/>
+            <a:ext cx="9991901" cy="4479667"/>
           </a:xfrm>
           <a:prstGeom prst="rect">
             <a:avLst/>
@@ -8540,7 +9985,7 @@
     </p:spTree>
     <p:extLst>
       <p:ext uri="{BB962C8B-B14F-4D97-AF65-F5344CB8AC3E}">
-        <p14:creationId xmlns:p14="http://schemas.microsoft.com/office/powerpoint/2010/main" val="1805163668"/>
+        <p14:creationId xmlns:p14="http://schemas.microsoft.com/office/powerpoint/2010/main" val="2871878040"/>
       </p:ext>
     </p:extLst>
   </p:cSld>
@@ -8553,6 +9998,14 @@
 <file path=ppt/slides/slide7.xml><?xml version="1.0" encoding="utf-8"?>
 <p:sld xmlns:a="http://schemas.openxmlformats.org/drawingml/2006/main" xmlns:r="http://schemas.openxmlformats.org/officeDocument/2006/relationships" xmlns:p="http://schemas.openxmlformats.org/presentationml/2006/main">
   <p:cSld>
+    <p:bg>
+      <p:bgPr>
+        <a:solidFill>
+          <a:schemeClr val="bg1"/>
+        </a:solidFill>
+        <a:effectLst/>
+      </p:bgPr>
+    </p:bg>
     <p:spTree>
       <p:nvGrpSpPr>
         <p:cNvPr id="1" name=""/>
@@ -9231,6 +10684,781 @@
           </a:lstStyle>
           <a:p>
             <a:pPr algn="l"/>
+            <a:endParaRPr lang="en-US" sz="4800" dirty="0">
+              <a:solidFill>
+                <a:srgbClr val="626971"/>
+              </a:solidFill>
+              <a:latin typeface="Helvetica Neue Medium"/>
+            </a:endParaRPr>
+          </a:p>
+        </p:txBody>
+      </p:sp>
+      <p:pic>
+        <p:nvPicPr>
+          <p:cNvPr id="11" name="Picture 10" descr="Logo&#10;&#10;Description automatically generated">
+            <a:extLst>
+              <a:ext uri="{FF2B5EF4-FFF2-40B4-BE49-F238E27FC236}">
+                <a16:creationId xmlns:a16="http://schemas.microsoft.com/office/drawing/2014/main" id="{F4642E13-3609-40AB-835D-027F038F77A1}"/>
+              </a:ext>
+            </a:extLst>
+          </p:cNvPr>
+          <p:cNvPicPr>
+            <a:picLocks noChangeAspect="1"/>
+          </p:cNvPicPr>
+          <p:nvPr/>
+        </p:nvPicPr>
+        <p:blipFill>
+          <a:blip r:embed="rId3">
+            <a:extLst>
+              <a:ext uri="{28A0092B-C50C-407E-A947-70E740481C1C}">
+                <a14:useLocalDpi xmlns:a14="http://schemas.microsoft.com/office/drawing/2010/main" val="0"/>
+              </a:ext>
+            </a:extLst>
+          </a:blip>
+          <a:stretch>
+            <a:fillRect/>
+          </a:stretch>
+        </p:blipFill>
+        <p:spPr>
+          <a:xfrm>
+            <a:off x="-3048" y="5323111"/>
+            <a:ext cx="4255247" cy="889733"/>
+          </a:xfrm>
+          <a:prstGeom prst="rect">
+            <a:avLst/>
+          </a:prstGeom>
+        </p:spPr>
+      </p:pic>
+      <p:pic>
+        <p:nvPicPr>
+          <p:cNvPr id="7" name="Picture 6" descr="Chart, scatter chart&#10;&#10;Description automatically generated">
+            <a:extLst>
+              <a:ext uri="{FF2B5EF4-FFF2-40B4-BE49-F238E27FC236}">
+                <a16:creationId xmlns:a16="http://schemas.microsoft.com/office/drawing/2014/main" id="{726E6772-2F5F-4AB1-B59E-8C11FAEDF9FE}"/>
+              </a:ext>
+            </a:extLst>
+          </p:cNvPr>
+          <p:cNvPicPr>
+            <a:picLocks noChangeAspect="1"/>
+          </p:cNvPicPr>
+          <p:nvPr/>
+        </p:nvPicPr>
+        <p:blipFill>
+          <a:blip r:embed="rId4">
+            <a:extLst>
+              <a:ext uri="{28A0092B-C50C-407E-A947-70E740481C1C}">
+                <a14:useLocalDpi xmlns:a14="http://schemas.microsoft.com/office/drawing/2010/main" val="0"/>
+              </a:ext>
+            </a:extLst>
+          </a:blip>
+          <a:stretch>
+            <a:fillRect/>
+          </a:stretch>
+        </p:blipFill>
+        <p:spPr>
+          <a:xfrm>
+            <a:off x="921829" y="81555"/>
+            <a:ext cx="10571303" cy="2967606"/>
+          </a:xfrm>
+          <a:prstGeom prst="rect">
+            <a:avLst/>
+          </a:prstGeom>
+        </p:spPr>
+      </p:pic>
+    </p:spTree>
+    <p:extLst>
+      <p:ext uri="{BB962C8B-B14F-4D97-AF65-F5344CB8AC3E}">
+        <p14:creationId xmlns:p14="http://schemas.microsoft.com/office/powerpoint/2010/main" val="1805163668"/>
+      </p:ext>
+    </p:extLst>
+  </p:cSld>
+  <p:clrMapOvr>
+    <a:masterClrMapping/>
+  </p:clrMapOvr>
+</p:sld>
+</file>
+
+<file path=ppt/slides/slide8.xml><?xml version="1.0" encoding="utf-8"?>
+<p:sld xmlns:a="http://schemas.openxmlformats.org/drawingml/2006/main" xmlns:r="http://schemas.openxmlformats.org/officeDocument/2006/relationships" xmlns:p="http://schemas.openxmlformats.org/presentationml/2006/main">
+  <p:cSld>
+    <p:spTree>
+      <p:nvGrpSpPr>
+        <p:cNvPr id="1" name=""/>
+        <p:cNvGrpSpPr/>
+        <p:nvPr/>
+      </p:nvGrpSpPr>
+      <p:grpSpPr>
+        <a:xfrm>
+          <a:off x="0" y="0"/>
+          <a:ext cx="0" cy="0"/>
+          <a:chOff x="0" y="0"/>
+          <a:chExt cx="0" cy="0"/>
+        </a:xfrm>
+      </p:grpSpPr>
+      <p:sp useBgFill="1">
+        <p:nvSpPr>
+          <p:cNvPr id="28" name="Rectangle 27">
+            <a:extLst>
+              <a:ext uri="{FF2B5EF4-FFF2-40B4-BE49-F238E27FC236}">
+                <a16:creationId xmlns:a16="http://schemas.microsoft.com/office/drawing/2014/main" id="{E183CBD3-765E-49B4-B3A8-B29203D43C8F}"/>
+              </a:ext>
+              <a:ext uri="{C183D7F6-B498-43B3-948B-1728B52AA6E4}">
+                <adec:decorative xmlns:adec="http://schemas.microsoft.com/office/drawing/2017/decorative" val="1"/>
+              </a:ext>
+            </a:extLst>
+          </p:cNvPr>
+          <p:cNvSpPr>
+            <a:spLocks noGrp="1" noRot="1" noChangeAspect="1" noMove="1" noResize="1" noEditPoints="1" noAdjustHandles="1" noChangeArrowheads="1" noChangeShapeType="1" noTextEdit="1"/>
+          </p:cNvSpPr>
+          <p:nvPr>
+            <p:extLst>
+              <p:ext uri="{386F3935-93C4-4BCD-93E2-E3B085C9AB24}">
+                <p16:designElem xmlns:p16="http://schemas.microsoft.com/office/powerpoint/2015/main" val="1"/>
+              </p:ext>
+            </p:extLst>
+          </p:nvPr>
+        </p:nvSpPr>
+        <p:spPr>
+          <a:xfrm>
+            <a:off x="0" y="0"/>
+            <a:ext cx="12188952" cy="6858000"/>
+          </a:xfrm>
+          <a:prstGeom prst="rect">
+            <a:avLst/>
+          </a:prstGeom>
+          <a:ln>
+            <a:noFill/>
+          </a:ln>
+        </p:spPr>
+        <p:style>
+          <a:lnRef idx="2">
+            <a:schemeClr val="accent1">
+              <a:shade val="50000"/>
+            </a:schemeClr>
+          </a:lnRef>
+          <a:fillRef idx="1">
+            <a:schemeClr val="accent1"/>
+          </a:fillRef>
+          <a:effectRef idx="0">
+            <a:schemeClr val="accent1"/>
+          </a:effectRef>
+          <a:fontRef idx="minor">
+            <a:schemeClr val="lt1"/>
+          </a:fontRef>
+        </p:style>
+        <p:txBody>
+          <a:bodyPr rtlCol="0" anchor="ctr"/>
+          <a:lstStyle>
+            <a:defPPr>
+              <a:defRPr lang="en-US"/>
+            </a:defPPr>
+            <a:lvl1pPr marL="0" algn="l" defTabSz="914400" rtl="0" eaLnBrk="1" latinLnBrk="0" hangingPunct="1">
+              <a:defRPr sz="1800" kern="1200">
+                <a:solidFill>
+                  <a:schemeClr val="lt1"/>
+                </a:solidFill>
+                <a:latin typeface="+mn-lt"/>
+                <a:ea typeface="+mn-ea"/>
+                <a:cs typeface="+mn-cs"/>
+              </a:defRPr>
+            </a:lvl1pPr>
+            <a:lvl2pPr marL="457200" algn="l" defTabSz="914400" rtl="0" eaLnBrk="1" latinLnBrk="0" hangingPunct="1">
+              <a:defRPr sz="1800" kern="1200">
+                <a:solidFill>
+                  <a:schemeClr val="lt1"/>
+                </a:solidFill>
+                <a:latin typeface="+mn-lt"/>
+                <a:ea typeface="+mn-ea"/>
+                <a:cs typeface="+mn-cs"/>
+              </a:defRPr>
+            </a:lvl2pPr>
+            <a:lvl3pPr marL="914400" algn="l" defTabSz="914400" rtl="0" eaLnBrk="1" latinLnBrk="0" hangingPunct="1">
+              <a:defRPr sz="1800" kern="1200">
+                <a:solidFill>
+                  <a:schemeClr val="lt1"/>
+                </a:solidFill>
+                <a:latin typeface="+mn-lt"/>
+                <a:ea typeface="+mn-ea"/>
+                <a:cs typeface="+mn-cs"/>
+              </a:defRPr>
+            </a:lvl3pPr>
+            <a:lvl4pPr marL="1371600" algn="l" defTabSz="914400" rtl="0" eaLnBrk="1" latinLnBrk="0" hangingPunct="1">
+              <a:defRPr sz="1800" kern="1200">
+                <a:solidFill>
+                  <a:schemeClr val="lt1"/>
+                </a:solidFill>
+                <a:latin typeface="+mn-lt"/>
+                <a:ea typeface="+mn-ea"/>
+                <a:cs typeface="+mn-cs"/>
+              </a:defRPr>
+            </a:lvl4pPr>
+            <a:lvl5pPr marL="1828800" algn="l" defTabSz="914400" rtl="0" eaLnBrk="1" latinLnBrk="0" hangingPunct="1">
+              <a:defRPr sz="1800" kern="1200">
+                <a:solidFill>
+                  <a:schemeClr val="lt1"/>
+                </a:solidFill>
+                <a:latin typeface="+mn-lt"/>
+                <a:ea typeface="+mn-ea"/>
+                <a:cs typeface="+mn-cs"/>
+              </a:defRPr>
+            </a:lvl5pPr>
+            <a:lvl6pPr marL="2286000" algn="l" defTabSz="914400" rtl="0" eaLnBrk="1" latinLnBrk="0" hangingPunct="1">
+              <a:defRPr sz="1800" kern="1200">
+                <a:solidFill>
+                  <a:schemeClr val="lt1"/>
+                </a:solidFill>
+                <a:latin typeface="+mn-lt"/>
+                <a:ea typeface="+mn-ea"/>
+                <a:cs typeface="+mn-cs"/>
+              </a:defRPr>
+            </a:lvl6pPr>
+            <a:lvl7pPr marL="2743200" algn="l" defTabSz="914400" rtl="0" eaLnBrk="1" latinLnBrk="0" hangingPunct="1">
+              <a:defRPr sz="1800" kern="1200">
+                <a:solidFill>
+                  <a:schemeClr val="lt1"/>
+                </a:solidFill>
+                <a:latin typeface="+mn-lt"/>
+                <a:ea typeface="+mn-ea"/>
+                <a:cs typeface="+mn-cs"/>
+              </a:defRPr>
+            </a:lvl7pPr>
+            <a:lvl8pPr marL="3200400" algn="l" defTabSz="914400" rtl="0" eaLnBrk="1" latinLnBrk="0" hangingPunct="1">
+              <a:defRPr sz="1800" kern="1200">
+                <a:solidFill>
+                  <a:schemeClr val="lt1"/>
+                </a:solidFill>
+                <a:latin typeface="+mn-lt"/>
+                <a:ea typeface="+mn-ea"/>
+                <a:cs typeface="+mn-cs"/>
+              </a:defRPr>
+            </a:lvl8pPr>
+            <a:lvl9pPr marL="3657600" algn="l" defTabSz="914400" rtl="0" eaLnBrk="1" latinLnBrk="0" hangingPunct="1">
+              <a:defRPr sz="1800" kern="1200">
+                <a:solidFill>
+                  <a:schemeClr val="lt1"/>
+                </a:solidFill>
+                <a:latin typeface="+mn-lt"/>
+                <a:ea typeface="+mn-ea"/>
+                <a:cs typeface="+mn-cs"/>
+              </a:defRPr>
+            </a:lvl9pPr>
+          </a:lstStyle>
+          <a:p>
+            <a:pPr algn="ctr"/>
+            <a:endParaRPr lang="en-US" dirty="0"/>
+          </a:p>
+        </p:txBody>
+      </p:sp>
+      <p:sp>
+        <p:nvSpPr>
+          <p:cNvPr id="30" name="Rectangle 29">
+            <a:extLst>
+              <a:ext uri="{FF2B5EF4-FFF2-40B4-BE49-F238E27FC236}">
+                <a16:creationId xmlns:a16="http://schemas.microsoft.com/office/drawing/2014/main" id="{CF76C0B7-929F-44F9-9C4C-B0AD48DCB32F}"/>
+              </a:ext>
+              <a:ext uri="{C183D7F6-B498-43B3-948B-1728B52AA6E4}">
+                <adec:decorative xmlns:adec="http://schemas.microsoft.com/office/drawing/2017/decorative" val="1"/>
+              </a:ext>
+            </a:extLst>
+          </p:cNvPr>
+          <p:cNvSpPr>
+            <a:spLocks noGrp="1" noRot="1" noChangeAspect="1" noMove="1" noResize="1" noEditPoints="1" noAdjustHandles="1" noChangeArrowheads="1" noChangeShapeType="1" noTextEdit="1"/>
+          </p:cNvSpPr>
+          <p:nvPr>
+            <p:extLst>
+              <p:ext uri="{386F3935-93C4-4BCD-93E2-E3B085C9AB24}">
+                <p16:designElem xmlns:p16="http://schemas.microsoft.com/office/powerpoint/2015/main" val="1"/>
+              </p:ext>
+            </p:extLst>
+          </p:nvPr>
+        </p:nvSpPr>
+        <p:spPr>
+          <a:xfrm>
+            <a:off x="1524" y="0"/>
+            <a:ext cx="12188952" cy="6858000"/>
+          </a:xfrm>
+          <a:prstGeom prst="rect">
+            <a:avLst/>
+          </a:prstGeom>
+          <a:solidFill>
+            <a:schemeClr val="bg2">
+              <a:alpha val="35000"/>
+            </a:schemeClr>
+          </a:solidFill>
+          <a:ln>
+            <a:noFill/>
+          </a:ln>
+        </p:spPr>
+        <p:style>
+          <a:lnRef idx="2">
+            <a:schemeClr val="accent1">
+              <a:shade val="50000"/>
+            </a:schemeClr>
+          </a:lnRef>
+          <a:fillRef idx="1">
+            <a:schemeClr val="accent1"/>
+          </a:fillRef>
+          <a:effectRef idx="0">
+            <a:schemeClr val="accent1"/>
+          </a:effectRef>
+          <a:fontRef idx="minor">
+            <a:schemeClr val="lt1"/>
+          </a:fontRef>
+        </p:style>
+        <p:txBody>
+          <a:bodyPr rtlCol="0" anchor="ctr"/>
+          <a:lstStyle>
+            <a:defPPr>
+              <a:defRPr lang="en-US"/>
+            </a:defPPr>
+            <a:lvl1pPr marL="0" algn="l" defTabSz="914400" rtl="0" eaLnBrk="1" latinLnBrk="0" hangingPunct="1">
+              <a:defRPr sz="1800" kern="1200">
+                <a:solidFill>
+                  <a:schemeClr val="lt1"/>
+                </a:solidFill>
+                <a:latin typeface="+mn-lt"/>
+                <a:ea typeface="+mn-ea"/>
+                <a:cs typeface="+mn-cs"/>
+              </a:defRPr>
+            </a:lvl1pPr>
+            <a:lvl2pPr marL="457200" algn="l" defTabSz="914400" rtl="0" eaLnBrk="1" latinLnBrk="0" hangingPunct="1">
+              <a:defRPr sz="1800" kern="1200">
+                <a:solidFill>
+                  <a:schemeClr val="lt1"/>
+                </a:solidFill>
+                <a:latin typeface="+mn-lt"/>
+                <a:ea typeface="+mn-ea"/>
+                <a:cs typeface="+mn-cs"/>
+              </a:defRPr>
+            </a:lvl2pPr>
+            <a:lvl3pPr marL="914400" algn="l" defTabSz="914400" rtl="0" eaLnBrk="1" latinLnBrk="0" hangingPunct="1">
+              <a:defRPr sz="1800" kern="1200">
+                <a:solidFill>
+                  <a:schemeClr val="lt1"/>
+                </a:solidFill>
+                <a:latin typeface="+mn-lt"/>
+                <a:ea typeface="+mn-ea"/>
+                <a:cs typeface="+mn-cs"/>
+              </a:defRPr>
+            </a:lvl3pPr>
+            <a:lvl4pPr marL="1371600" algn="l" defTabSz="914400" rtl="0" eaLnBrk="1" latinLnBrk="0" hangingPunct="1">
+              <a:defRPr sz="1800" kern="1200">
+                <a:solidFill>
+                  <a:schemeClr val="lt1"/>
+                </a:solidFill>
+                <a:latin typeface="+mn-lt"/>
+                <a:ea typeface="+mn-ea"/>
+                <a:cs typeface="+mn-cs"/>
+              </a:defRPr>
+            </a:lvl4pPr>
+            <a:lvl5pPr marL="1828800" algn="l" defTabSz="914400" rtl="0" eaLnBrk="1" latinLnBrk="0" hangingPunct="1">
+              <a:defRPr sz="1800" kern="1200">
+                <a:solidFill>
+                  <a:schemeClr val="lt1"/>
+                </a:solidFill>
+                <a:latin typeface="+mn-lt"/>
+                <a:ea typeface="+mn-ea"/>
+                <a:cs typeface="+mn-cs"/>
+              </a:defRPr>
+            </a:lvl5pPr>
+            <a:lvl6pPr marL="2286000" algn="l" defTabSz="914400" rtl="0" eaLnBrk="1" latinLnBrk="0" hangingPunct="1">
+              <a:defRPr sz="1800" kern="1200">
+                <a:solidFill>
+                  <a:schemeClr val="lt1"/>
+                </a:solidFill>
+                <a:latin typeface="+mn-lt"/>
+                <a:ea typeface="+mn-ea"/>
+                <a:cs typeface="+mn-cs"/>
+              </a:defRPr>
+            </a:lvl6pPr>
+            <a:lvl7pPr marL="2743200" algn="l" defTabSz="914400" rtl="0" eaLnBrk="1" latinLnBrk="0" hangingPunct="1">
+              <a:defRPr sz="1800" kern="1200">
+                <a:solidFill>
+                  <a:schemeClr val="lt1"/>
+                </a:solidFill>
+                <a:latin typeface="+mn-lt"/>
+                <a:ea typeface="+mn-ea"/>
+                <a:cs typeface="+mn-cs"/>
+              </a:defRPr>
+            </a:lvl7pPr>
+            <a:lvl8pPr marL="3200400" algn="l" defTabSz="914400" rtl="0" eaLnBrk="1" latinLnBrk="0" hangingPunct="1">
+              <a:defRPr sz="1800" kern="1200">
+                <a:solidFill>
+                  <a:schemeClr val="lt1"/>
+                </a:solidFill>
+                <a:latin typeface="+mn-lt"/>
+                <a:ea typeface="+mn-ea"/>
+                <a:cs typeface="+mn-cs"/>
+              </a:defRPr>
+            </a:lvl8pPr>
+            <a:lvl9pPr marL="3657600" algn="l" defTabSz="914400" rtl="0" eaLnBrk="1" latinLnBrk="0" hangingPunct="1">
+              <a:defRPr sz="1800" kern="1200">
+                <a:solidFill>
+                  <a:schemeClr val="lt1"/>
+                </a:solidFill>
+                <a:latin typeface="+mn-lt"/>
+                <a:ea typeface="+mn-ea"/>
+                <a:cs typeface="+mn-cs"/>
+              </a:defRPr>
+            </a:lvl9pPr>
+          </a:lstStyle>
+          <a:p>
+            <a:pPr algn="ctr"/>
+            <a:endParaRPr lang="en-US" dirty="0"/>
+          </a:p>
+        </p:txBody>
+      </p:sp>
+      <p:sp>
+        <p:nvSpPr>
+          <p:cNvPr id="32" name="Rectangle 31">
+            <a:extLst>
+              <a:ext uri="{FF2B5EF4-FFF2-40B4-BE49-F238E27FC236}">
+                <a16:creationId xmlns:a16="http://schemas.microsoft.com/office/drawing/2014/main" id="{A567A692-E165-4BCD-842C-A9081974A9F8}"/>
+              </a:ext>
+              <a:ext uri="{C183D7F6-B498-43B3-948B-1728B52AA6E4}">
+                <adec:decorative xmlns:adec="http://schemas.microsoft.com/office/drawing/2017/decorative" val="1"/>
+              </a:ext>
+            </a:extLst>
+          </p:cNvPr>
+          <p:cNvSpPr>
+            <a:spLocks noGrp="1" noRot="1" noChangeAspect="1" noMove="1" noResize="1" noEditPoints="1" noAdjustHandles="1" noChangeArrowheads="1" noChangeShapeType="1" noTextEdit="1"/>
+          </p:cNvSpPr>
+          <p:nvPr>
+            <p:extLst>
+              <p:ext uri="{386F3935-93C4-4BCD-93E2-E3B085C9AB24}">
+                <p16:designElem xmlns:p16="http://schemas.microsoft.com/office/powerpoint/2015/main" val="1"/>
+              </p:ext>
+            </p:extLst>
+          </p:nvPr>
+        </p:nvSpPr>
+        <p:spPr>
+          <a:xfrm>
+            <a:off x="1446276" y="685800"/>
+            <a:ext cx="10744200" cy="5486400"/>
+          </a:xfrm>
+          <a:prstGeom prst="rect">
+            <a:avLst/>
+          </a:prstGeom>
+          <a:solidFill>
+            <a:schemeClr val="bg1"/>
+          </a:solidFill>
+          <a:ln>
+            <a:noFill/>
+          </a:ln>
+        </p:spPr>
+        <p:style>
+          <a:lnRef idx="2">
+            <a:schemeClr val="accent1">
+              <a:shade val="50000"/>
+            </a:schemeClr>
+          </a:lnRef>
+          <a:fillRef idx="1">
+            <a:schemeClr val="accent1"/>
+          </a:fillRef>
+          <a:effectRef idx="0">
+            <a:schemeClr val="accent1"/>
+          </a:effectRef>
+          <a:fontRef idx="minor">
+            <a:schemeClr val="lt1"/>
+          </a:fontRef>
+        </p:style>
+        <p:txBody>
+          <a:bodyPr rtlCol="0" anchor="ctr"/>
+          <a:lstStyle/>
+          <a:p>
+            <a:pPr algn="ctr"/>
+            <a:endParaRPr lang="en-US"/>
+          </a:p>
+        </p:txBody>
+      </p:sp>
+      <p:sp>
+        <p:nvSpPr>
+          <p:cNvPr id="34" name="Rectangle 33">
+            <a:extLst>
+              <a:ext uri="{FF2B5EF4-FFF2-40B4-BE49-F238E27FC236}">
+                <a16:creationId xmlns:a16="http://schemas.microsoft.com/office/drawing/2014/main" id="{20616EB7-E723-4BF0-AC20-B8CD75A4FC12}"/>
+              </a:ext>
+              <a:ext uri="{C183D7F6-B498-43B3-948B-1728B52AA6E4}">
+                <adec:decorative xmlns:adec="http://schemas.microsoft.com/office/drawing/2017/decorative" val="1"/>
+              </a:ext>
+            </a:extLst>
+          </p:cNvPr>
+          <p:cNvSpPr>
+            <a:spLocks noGrp="1" noRot="1" noChangeAspect="1" noMove="1" noResize="1" noEditPoints="1" noAdjustHandles="1" noChangeArrowheads="1" noChangeShapeType="1" noTextEdit="1"/>
+          </p:cNvSpPr>
+          <p:nvPr>
+            <p:extLst>
+              <p:ext uri="{386F3935-93C4-4BCD-93E2-E3B085C9AB24}">
+                <p16:designElem xmlns:p16="http://schemas.microsoft.com/office/powerpoint/2015/main" val="1"/>
+              </p:ext>
+            </p:extLst>
+          </p:nvPr>
+        </p:nvSpPr>
+        <p:spPr>
+          <a:xfrm rot="10800000">
+            <a:off x="11496180" y="680188"/>
+            <a:ext cx="695819" cy="5486399"/>
+          </a:xfrm>
+          <a:prstGeom prst="rect">
+            <a:avLst/>
+          </a:prstGeom>
+          <a:solidFill>
+            <a:srgbClr val="3FC1F8">
+              <a:alpha val="25000"/>
+            </a:srgbClr>
+          </a:solidFill>
+          <a:ln w="25400" cap="flat">
+            <a:noFill/>
+            <a:prstDash val="solid"/>
+            <a:round/>
+          </a:ln>
+          <a:effectLst/>
+          <a:sp3d/>
+        </p:spPr>
+        <p:style>
+          <a:lnRef idx="0">
+            <a:scrgbClr r="0" g="0" b="0"/>
+          </a:lnRef>
+          <a:fillRef idx="0">
+            <a:scrgbClr r="0" g="0" b="0"/>
+          </a:fillRef>
+          <a:effectRef idx="0">
+            <a:scrgbClr r="0" g="0" b="0"/>
+          </a:effectRef>
+          <a:fontRef idx="none"/>
+        </p:style>
+        <p:txBody>
+          <a:bodyPr rot="0" spcFirstLastPara="1" vertOverflow="overflow" horzOverflow="overflow" vert="horz" wrap="square" lIns="0" tIns="0" rIns="0" bIns="0" numCol="1" spcCol="38100" rtlCol="0" anchor="ctr">
+            <a:spAutoFit/>
+          </a:bodyPr>
+          <a:lstStyle/>
+          <a:p>
+            <a:pPr marL="0" marR="0" indent="0" algn="ctr" defTabSz="825500" rtl="0" fontAlgn="auto" latinLnBrk="0" hangingPunct="0">
+              <a:lnSpc>
+                <a:spcPct val="100000"/>
+              </a:lnSpc>
+              <a:spcBef>
+                <a:spcPts val="0"/>
+              </a:spcBef>
+              <a:spcAft>
+                <a:spcPts val="0"/>
+              </a:spcAft>
+              <a:buClrTx/>
+              <a:buSzTx/>
+              <a:buFontTx/>
+              <a:buNone/>
+              <a:tabLst/>
+            </a:pPr>
+            <a:endParaRPr kumimoji="0" lang="en-US" sz="3000" b="0" i="0" u="none" strike="noStrike" cap="none" spc="0" normalizeH="0" baseline="0">
+              <a:ln>
+                <a:noFill/>
+              </a:ln>
+              <a:solidFill>
+                <a:srgbClr val="000000"/>
+              </a:solidFill>
+              <a:effectLst/>
+              <a:uFillTx/>
+              <a:latin typeface="Helvetica Neue Medium"/>
+              <a:ea typeface="Helvetica Neue Medium"/>
+              <a:cs typeface="Helvetica Neue Medium"/>
+              <a:sym typeface="Helvetica Neue Medium"/>
+            </a:endParaRPr>
+          </a:p>
+        </p:txBody>
+      </p:sp>
+      <p:cxnSp>
+        <p:nvCxnSpPr>
+          <p:cNvPr id="36" name="Straight Connector 35">
+            <a:extLst>
+              <a:ext uri="{FF2B5EF4-FFF2-40B4-BE49-F238E27FC236}">
+                <a16:creationId xmlns:a16="http://schemas.microsoft.com/office/drawing/2014/main" id="{35D3937F-89B8-4A4C-BA42-C663D9B6C8E3}"/>
+              </a:ext>
+              <a:ext uri="{C183D7F6-B498-43B3-948B-1728B52AA6E4}">
+                <adec:decorative xmlns:adec="http://schemas.microsoft.com/office/drawing/2017/decorative" val="1"/>
+              </a:ext>
+            </a:extLst>
+          </p:cNvPr>
+          <p:cNvCxnSpPr>
+            <a:cxnSpLocks noGrp="1" noRot="1" noChangeAspect="1" noMove="1" noResize="1" noEditPoints="1" noAdjustHandles="1" noChangeArrowheads="1" noChangeShapeType="1"/>
+          </p:cNvCxnSpPr>
+          <p:nvPr>
+            <p:extLst>
+              <p:ext uri="{386F3935-93C4-4BCD-93E2-E3B085C9AB24}">
+                <p16:designElem xmlns:p16="http://schemas.microsoft.com/office/powerpoint/2015/main" val="1"/>
+              </p:ext>
+            </p:extLst>
+          </p:nvPr>
+        </p:nvCxnSpPr>
+        <p:spPr>
+          <a:xfrm flipV="1">
+            <a:off x="11496184" y="5610"/>
+            <a:ext cx="0" cy="6858000"/>
+          </a:xfrm>
+          <a:prstGeom prst="line">
+            <a:avLst/>
+          </a:prstGeom>
+          <a:ln w="9525" cap="rnd">
+            <a:solidFill>
+              <a:srgbClr val="3FC1F8"/>
+            </a:solidFill>
+            <a:prstDash val="dash"/>
+          </a:ln>
+        </p:spPr>
+        <p:style>
+          <a:lnRef idx="1">
+            <a:schemeClr val="accent1"/>
+          </a:lnRef>
+          <a:fillRef idx="0">
+            <a:schemeClr val="accent1"/>
+          </a:fillRef>
+          <a:effectRef idx="0">
+            <a:schemeClr val="accent1"/>
+          </a:effectRef>
+          <a:fontRef idx="minor">
+            <a:schemeClr val="tx1"/>
+          </a:fontRef>
+        </p:style>
+      </p:cxnSp>
+      <p:cxnSp>
+        <p:nvCxnSpPr>
+          <p:cNvPr id="38" name="Straight Connector 37">
+            <a:extLst>
+              <a:ext uri="{FF2B5EF4-FFF2-40B4-BE49-F238E27FC236}">
+                <a16:creationId xmlns:a16="http://schemas.microsoft.com/office/drawing/2014/main" id="{F04C3AED-6D36-45C0-95CD-A7378D9DD6C3}"/>
+              </a:ext>
+              <a:ext uri="{C183D7F6-B498-43B3-948B-1728B52AA6E4}">
+                <adec:decorative xmlns:adec="http://schemas.microsoft.com/office/drawing/2017/decorative" val="1"/>
+              </a:ext>
+            </a:extLst>
+          </p:cNvPr>
+          <p:cNvCxnSpPr>
+            <a:cxnSpLocks noGrp="1" noRot="1" noChangeAspect="1" noMove="1" noResize="1" noEditPoints="1" noAdjustHandles="1" noChangeArrowheads="1" noChangeShapeType="1"/>
+          </p:cNvCxnSpPr>
+          <p:nvPr>
+            <p:extLst>
+              <p:ext uri="{386F3935-93C4-4BCD-93E2-E3B085C9AB24}">
+                <p16:designElem xmlns:p16="http://schemas.microsoft.com/office/powerpoint/2015/main" val="1"/>
+              </p:ext>
+            </p:extLst>
+          </p:nvPr>
+        </p:nvCxnSpPr>
+        <p:spPr>
+          <a:xfrm>
+            <a:off x="1524" y="6172200"/>
+            <a:ext cx="12192000" cy="0"/>
+          </a:xfrm>
+          <a:prstGeom prst="line">
+            <a:avLst/>
+          </a:prstGeom>
+          <a:solidFill>
+            <a:srgbClr val="3FC1F8"/>
+          </a:solidFill>
+          <a:ln w="9525" cap="rnd">
+            <a:solidFill>
+              <a:schemeClr val="accent1"/>
+            </a:solidFill>
+            <a:prstDash val="dash"/>
+          </a:ln>
+        </p:spPr>
+        <p:style>
+          <a:lnRef idx="1">
+            <a:schemeClr val="accent1"/>
+          </a:lnRef>
+          <a:fillRef idx="0">
+            <a:schemeClr val="accent1"/>
+          </a:fillRef>
+          <a:effectRef idx="0">
+            <a:schemeClr val="accent1"/>
+          </a:effectRef>
+          <a:fontRef idx="minor">
+            <a:schemeClr val="tx1"/>
+          </a:fontRef>
+        </p:style>
+      </p:cxnSp>
+      <p:pic>
+        <p:nvPicPr>
+          <p:cNvPr id="6" name="Picture 5" descr="A picture containing shape&#10;&#10;Description automatically generated">
+            <a:extLst>
+              <a:ext uri="{FF2B5EF4-FFF2-40B4-BE49-F238E27FC236}">
+                <a16:creationId xmlns:a16="http://schemas.microsoft.com/office/drawing/2014/main" id="{154CBE51-93AD-41C7-9776-41EB07A4D13B}"/>
+              </a:ext>
+            </a:extLst>
+          </p:cNvPr>
+          <p:cNvPicPr>
+            <a:picLocks noChangeAspect="1"/>
+          </p:cNvPicPr>
+          <p:nvPr/>
+        </p:nvPicPr>
+        <p:blipFill>
+          <a:blip r:embed="rId2">
+            <a:extLst>
+              <a:ext uri="{28A0092B-C50C-407E-A947-70E740481C1C}">
+                <a14:useLocalDpi xmlns:a14="http://schemas.microsoft.com/office/drawing/2010/main" val="0"/>
+              </a:ext>
+            </a:extLst>
+          </a:blip>
+          <a:stretch>
+            <a:fillRect/>
+          </a:stretch>
+        </p:blipFill>
+        <p:spPr>
+          <a:xfrm>
+            <a:off x="11560631" y="6212844"/>
+            <a:ext cx="628320" cy="628320"/>
+          </a:xfrm>
+          <a:prstGeom prst="rect">
+            <a:avLst/>
+          </a:prstGeom>
+        </p:spPr>
+      </p:pic>
+      <p:sp>
+        <p:nvSpPr>
+          <p:cNvPr id="19" name="Title 1">
+            <a:extLst>
+              <a:ext uri="{FF2B5EF4-FFF2-40B4-BE49-F238E27FC236}">
+                <a16:creationId xmlns:a16="http://schemas.microsoft.com/office/drawing/2014/main" id="{EA9A5F1F-098B-407D-8466-39E797E06AD4}"/>
+              </a:ext>
+            </a:extLst>
+          </p:cNvPr>
+          <p:cNvSpPr txBox="1">
+            <a:spLocks/>
+          </p:cNvSpPr>
+          <p:nvPr/>
+        </p:nvSpPr>
+        <p:spPr>
+          <a:xfrm>
+            <a:off x="422899" y="576263"/>
+            <a:ext cx="5616236" cy="2967606"/>
+          </a:xfrm>
+          <a:prstGeom prst="rect">
+            <a:avLst/>
+          </a:prstGeom>
+        </p:spPr>
+        <p:txBody>
+          <a:bodyPr vert="horz" lIns="91440" tIns="45720" rIns="91440" bIns="45720" rtlCol="0" anchor="b">
+            <a:normAutofit/>
+          </a:bodyPr>
+          <a:lstStyle>
+            <a:lvl1pPr algn="ctr" defTabSz="914400" rtl="0" eaLnBrk="1" latinLnBrk="0" hangingPunct="1">
+              <a:lnSpc>
+                <a:spcPct val="90000"/>
+              </a:lnSpc>
+              <a:spcBef>
+                <a:spcPct val="0"/>
+              </a:spcBef>
+              <a:buNone/>
+              <a:defRPr sz="5200" kern="1200">
+                <a:solidFill>
+                  <a:schemeClr val="tx2"/>
+                </a:solidFill>
+                <a:latin typeface="+mj-lt"/>
+                <a:ea typeface="+mj-ea"/>
+                <a:cs typeface="+mj-cs"/>
+              </a:defRPr>
+            </a:lvl1pPr>
+          </a:lstStyle>
+          <a:p>
+            <a:pPr algn="l"/>
             <a:r>
               <a:rPr lang="en-US" sz="4800" dirty="0">
                 <a:solidFill>
@@ -9278,7 +11506,7 @@
                 </a:solidFill>
                 <a:latin typeface="Helvetica Neue Medium"/>
               </a:rPr>
-              <a:t>Scrape </a:t>
+              <a:t>Build </a:t>
             </a:r>
             <a:r>
               <a:rPr lang="en-US" sz="2400" dirty="0" err="1">
@@ -9289,12 +11517,15 @@
               </a:rPr>
               <a:t>KeepTradeCut</a:t>
             </a:r>
-            <a:endParaRPr lang="en-US" sz="2400" dirty="0">
-              <a:solidFill>
-                <a:srgbClr val="626971"/>
-              </a:solidFill>
-              <a:latin typeface="Helvetica Neue Medium"/>
-            </a:endParaRPr>
+            <a:r>
+              <a:rPr lang="en-US" sz="2400" dirty="0">
+                <a:solidFill>
+                  <a:srgbClr val="626971"/>
+                </a:solidFill>
+                <a:latin typeface="Helvetica Neue Medium"/>
+              </a:rPr>
+              <a:t> data pipeline</a:t>
+            </a:r>
           </a:p>
           <a:p>
             <a:endParaRPr lang="en-US" sz="2400" dirty="0">
@@ -9413,7 +11644,7 @@
                 </a:solidFill>
                 <a:latin typeface="Helvetica Neue Medium"/>
               </a:rPr>
-              <a:t>Build the Shiny App</a:t>
+              <a:t>Build Shiny App</a:t>
             </a:r>
           </a:p>
         </p:txBody>
@@ -9536,6 +11767,9 @@
           <a:prstGeom prst="downArrow">
             <a:avLst/>
           </a:prstGeom>
+          <a:solidFill>
+            <a:srgbClr val="E5505C"/>
+          </a:solidFill>
         </p:spPr>
         <p:style>
           <a:lnRef idx="2">
@@ -9566,6 +11800,940 @@
     <p:extLst>
       <p:ext uri="{BB962C8B-B14F-4D97-AF65-F5344CB8AC3E}">
         <p14:creationId xmlns:p14="http://schemas.microsoft.com/office/powerpoint/2010/main" val="1455861658"/>
+      </p:ext>
+    </p:extLst>
+  </p:cSld>
+  <p:clrMapOvr>
+    <a:masterClrMapping/>
+  </p:clrMapOvr>
+</p:sld>
+</file>
+
+<file path=ppt/slides/slide9.xml><?xml version="1.0" encoding="utf-8"?>
+<p:sld xmlns:a="http://schemas.openxmlformats.org/drawingml/2006/main" xmlns:r="http://schemas.openxmlformats.org/officeDocument/2006/relationships" xmlns:p="http://schemas.openxmlformats.org/presentationml/2006/main">
+  <p:cSld>
+    <p:spTree>
+      <p:nvGrpSpPr>
+        <p:cNvPr id="1" name=""/>
+        <p:cNvGrpSpPr/>
+        <p:nvPr/>
+      </p:nvGrpSpPr>
+      <p:grpSpPr>
+        <a:xfrm>
+          <a:off x="0" y="0"/>
+          <a:ext cx="0" cy="0"/>
+          <a:chOff x="0" y="0"/>
+          <a:chExt cx="0" cy="0"/>
+        </a:xfrm>
+      </p:grpSpPr>
+      <p:sp useBgFill="1">
+        <p:nvSpPr>
+          <p:cNvPr id="28" name="Rectangle 27">
+            <a:extLst>
+              <a:ext uri="{FF2B5EF4-FFF2-40B4-BE49-F238E27FC236}">
+                <a16:creationId xmlns:a16="http://schemas.microsoft.com/office/drawing/2014/main" id="{E183CBD3-765E-49B4-B3A8-B29203D43C8F}"/>
+              </a:ext>
+              <a:ext uri="{C183D7F6-B498-43B3-948B-1728B52AA6E4}">
+                <adec:decorative xmlns:adec="http://schemas.microsoft.com/office/drawing/2017/decorative" val="1"/>
+              </a:ext>
+            </a:extLst>
+          </p:cNvPr>
+          <p:cNvSpPr>
+            <a:spLocks noGrp="1" noRot="1" noChangeAspect="1" noMove="1" noResize="1" noEditPoints="1" noAdjustHandles="1" noChangeArrowheads="1" noChangeShapeType="1" noTextEdit="1"/>
+          </p:cNvSpPr>
+          <p:nvPr>
+            <p:extLst>
+              <p:ext uri="{386F3935-93C4-4BCD-93E2-E3B085C9AB24}">
+                <p16:designElem xmlns:p16="http://schemas.microsoft.com/office/powerpoint/2015/main" val="1"/>
+              </p:ext>
+            </p:extLst>
+          </p:nvPr>
+        </p:nvSpPr>
+        <p:spPr>
+          <a:xfrm>
+            <a:off x="0" y="0"/>
+            <a:ext cx="12188952" cy="6858000"/>
+          </a:xfrm>
+          <a:prstGeom prst="rect">
+            <a:avLst/>
+          </a:prstGeom>
+          <a:ln>
+            <a:noFill/>
+          </a:ln>
+        </p:spPr>
+        <p:style>
+          <a:lnRef idx="2">
+            <a:schemeClr val="accent1">
+              <a:shade val="50000"/>
+            </a:schemeClr>
+          </a:lnRef>
+          <a:fillRef idx="1">
+            <a:schemeClr val="accent1"/>
+          </a:fillRef>
+          <a:effectRef idx="0">
+            <a:schemeClr val="accent1"/>
+          </a:effectRef>
+          <a:fontRef idx="minor">
+            <a:schemeClr val="lt1"/>
+          </a:fontRef>
+        </p:style>
+        <p:txBody>
+          <a:bodyPr rtlCol="0" anchor="ctr"/>
+          <a:lstStyle>
+            <a:defPPr>
+              <a:defRPr lang="en-US"/>
+            </a:defPPr>
+            <a:lvl1pPr marL="0" algn="l" defTabSz="914400" rtl="0" eaLnBrk="1" latinLnBrk="0" hangingPunct="1">
+              <a:defRPr sz="1800" kern="1200">
+                <a:solidFill>
+                  <a:schemeClr val="lt1"/>
+                </a:solidFill>
+                <a:latin typeface="+mn-lt"/>
+                <a:ea typeface="+mn-ea"/>
+                <a:cs typeface="+mn-cs"/>
+              </a:defRPr>
+            </a:lvl1pPr>
+            <a:lvl2pPr marL="457200" algn="l" defTabSz="914400" rtl="0" eaLnBrk="1" latinLnBrk="0" hangingPunct="1">
+              <a:defRPr sz="1800" kern="1200">
+                <a:solidFill>
+                  <a:schemeClr val="lt1"/>
+                </a:solidFill>
+                <a:latin typeface="+mn-lt"/>
+                <a:ea typeface="+mn-ea"/>
+                <a:cs typeface="+mn-cs"/>
+              </a:defRPr>
+            </a:lvl2pPr>
+            <a:lvl3pPr marL="914400" algn="l" defTabSz="914400" rtl="0" eaLnBrk="1" latinLnBrk="0" hangingPunct="1">
+              <a:defRPr sz="1800" kern="1200">
+                <a:solidFill>
+                  <a:schemeClr val="lt1"/>
+                </a:solidFill>
+                <a:latin typeface="+mn-lt"/>
+                <a:ea typeface="+mn-ea"/>
+                <a:cs typeface="+mn-cs"/>
+              </a:defRPr>
+            </a:lvl3pPr>
+            <a:lvl4pPr marL="1371600" algn="l" defTabSz="914400" rtl="0" eaLnBrk="1" latinLnBrk="0" hangingPunct="1">
+              <a:defRPr sz="1800" kern="1200">
+                <a:solidFill>
+                  <a:schemeClr val="lt1"/>
+                </a:solidFill>
+                <a:latin typeface="+mn-lt"/>
+                <a:ea typeface="+mn-ea"/>
+                <a:cs typeface="+mn-cs"/>
+              </a:defRPr>
+            </a:lvl4pPr>
+            <a:lvl5pPr marL="1828800" algn="l" defTabSz="914400" rtl="0" eaLnBrk="1" latinLnBrk="0" hangingPunct="1">
+              <a:defRPr sz="1800" kern="1200">
+                <a:solidFill>
+                  <a:schemeClr val="lt1"/>
+                </a:solidFill>
+                <a:latin typeface="+mn-lt"/>
+                <a:ea typeface="+mn-ea"/>
+                <a:cs typeface="+mn-cs"/>
+              </a:defRPr>
+            </a:lvl5pPr>
+            <a:lvl6pPr marL="2286000" algn="l" defTabSz="914400" rtl="0" eaLnBrk="1" latinLnBrk="0" hangingPunct="1">
+              <a:defRPr sz="1800" kern="1200">
+                <a:solidFill>
+                  <a:schemeClr val="lt1"/>
+                </a:solidFill>
+                <a:latin typeface="+mn-lt"/>
+                <a:ea typeface="+mn-ea"/>
+                <a:cs typeface="+mn-cs"/>
+              </a:defRPr>
+            </a:lvl6pPr>
+            <a:lvl7pPr marL="2743200" algn="l" defTabSz="914400" rtl="0" eaLnBrk="1" latinLnBrk="0" hangingPunct="1">
+              <a:defRPr sz="1800" kern="1200">
+                <a:solidFill>
+                  <a:schemeClr val="lt1"/>
+                </a:solidFill>
+                <a:latin typeface="+mn-lt"/>
+                <a:ea typeface="+mn-ea"/>
+                <a:cs typeface="+mn-cs"/>
+              </a:defRPr>
+            </a:lvl7pPr>
+            <a:lvl8pPr marL="3200400" algn="l" defTabSz="914400" rtl="0" eaLnBrk="1" latinLnBrk="0" hangingPunct="1">
+              <a:defRPr sz="1800" kern="1200">
+                <a:solidFill>
+                  <a:schemeClr val="lt1"/>
+                </a:solidFill>
+                <a:latin typeface="+mn-lt"/>
+                <a:ea typeface="+mn-ea"/>
+                <a:cs typeface="+mn-cs"/>
+              </a:defRPr>
+            </a:lvl8pPr>
+            <a:lvl9pPr marL="3657600" algn="l" defTabSz="914400" rtl="0" eaLnBrk="1" latinLnBrk="0" hangingPunct="1">
+              <a:defRPr sz="1800" kern="1200">
+                <a:solidFill>
+                  <a:schemeClr val="lt1"/>
+                </a:solidFill>
+                <a:latin typeface="+mn-lt"/>
+                <a:ea typeface="+mn-ea"/>
+                <a:cs typeface="+mn-cs"/>
+              </a:defRPr>
+            </a:lvl9pPr>
+          </a:lstStyle>
+          <a:p>
+            <a:pPr algn="ctr"/>
+            <a:endParaRPr lang="en-US" dirty="0"/>
+          </a:p>
+        </p:txBody>
+      </p:sp>
+      <p:sp>
+        <p:nvSpPr>
+          <p:cNvPr id="30" name="Rectangle 29">
+            <a:extLst>
+              <a:ext uri="{FF2B5EF4-FFF2-40B4-BE49-F238E27FC236}">
+                <a16:creationId xmlns:a16="http://schemas.microsoft.com/office/drawing/2014/main" id="{CF76C0B7-929F-44F9-9C4C-B0AD48DCB32F}"/>
+              </a:ext>
+              <a:ext uri="{C183D7F6-B498-43B3-948B-1728B52AA6E4}">
+                <adec:decorative xmlns:adec="http://schemas.microsoft.com/office/drawing/2017/decorative" val="1"/>
+              </a:ext>
+            </a:extLst>
+          </p:cNvPr>
+          <p:cNvSpPr>
+            <a:spLocks noGrp="1" noRot="1" noChangeAspect="1" noMove="1" noResize="1" noEditPoints="1" noAdjustHandles="1" noChangeArrowheads="1" noChangeShapeType="1" noTextEdit="1"/>
+          </p:cNvSpPr>
+          <p:nvPr>
+            <p:extLst>
+              <p:ext uri="{386F3935-93C4-4BCD-93E2-E3B085C9AB24}">
+                <p16:designElem xmlns:p16="http://schemas.microsoft.com/office/powerpoint/2015/main" val="1"/>
+              </p:ext>
+            </p:extLst>
+          </p:nvPr>
+        </p:nvSpPr>
+        <p:spPr>
+          <a:xfrm>
+            <a:off x="1524" y="0"/>
+            <a:ext cx="12188952" cy="6858000"/>
+          </a:xfrm>
+          <a:prstGeom prst="rect">
+            <a:avLst/>
+          </a:prstGeom>
+          <a:solidFill>
+            <a:schemeClr val="bg2">
+              <a:alpha val="35000"/>
+            </a:schemeClr>
+          </a:solidFill>
+          <a:ln>
+            <a:noFill/>
+          </a:ln>
+        </p:spPr>
+        <p:style>
+          <a:lnRef idx="2">
+            <a:schemeClr val="accent1">
+              <a:shade val="50000"/>
+            </a:schemeClr>
+          </a:lnRef>
+          <a:fillRef idx="1">
+            <a:schemeClr val="accent1"/>
+          </a:fillRef>
+          <a:effectRef idx="0">
+            <a:schemeClr val="accent1"/>
+          </a:effectRef>
+          <a:fontRef idx="minor">
+            <a:schemeClr val="lt1"/>
+          </a:fontRef>
+        </p:style>
+        <p:txBody>
+          <a:bodyPr rtlCol="0" anchor="ctr"/>
+          <a:lstStyle>
+            <a:defPPr>
+              <a:defRPr lang="en-US"/>
+            </a:defPPr>
+            <a:lvl1pPr marL="0" algn="l" defTabSz="914400" rtl="0" eaLnBrk="1" latinLnBrk="0" hangingPunct="1">
+              <a:defRPr sz="1800" kern="1200">
+                <a:solidFill>
+                  <a:schemeClr val="lt1"/>
+                </a:solidFill>
+                <a:latin typeface="+mn-lt"/>
+                <a:ea typeface="+mn-ea"/>
+                <a:cs typeface="+mn-cs"/>
+              </a:defRPr>
+            </a:lvl1pPr>
+            <a:lvl2pPr marL="457200" algn="l" defTabSz="914400" rtl="0" eaLnBrk="1" latinLnBrk="0" hangingPunct="1">
+              <a:defRPr sz="1800" kern="1200">
+                <a:solidFill>
+                  <a:schemeClr val="lt1"/>
+                </a:solidFill>
+                <a:latin typeface="+mn-lt"/>
+                <a:ea typeface="+mn-ea"/>
+                <a:cs typeface="+mn-cs"/>
+              </a:defRPr>
+            </a:lvl2pPr>
+            <a:lvl3pPr marL="914400" algn="l" defTabSz="914400" rtl="0" eaLnBrk="1" latinLnBrk="0" hangingPunct="1">
+              <a:defRPr sz="1800" kern="1200">
+                <a:solidFill>
+                  <a:schemeClr val="lt1"/>
+                </a:solidFill>
+                <a:latin typeface="+mn-lt"/>
+                <a:ea typeface="+mn-ea"/>
+                <a:cs typeface="+mn-cs"/>
+              </a:defRPr>
+            </a:lvl3pPr>
+            <a:lvl4pPr marL="1371600" algn="l" defTabSz="914400" rtl="0" eaLnBrk="1" latinLnBrk="0" hangingPunct="1">
+              <a:defRPr sz="1800" kern="1200">
+                <a:solidFill>
+                  <a:schemeClr val="lt1"/>
+                </a:solidFill>
+                <a:latin typeface="+mn-lt"/>
+                <a:ea typeface="+mn-ea"/>
+                <a:cs typeface="+mn-cs"/>
+              </a:defRPr>
+            </a:lvl4pPr>
+            <a:lvl5pPr marL="1828800" algn="l" defTabSz="914400" rtl="0" eaLnBrk="1" latinLnBrk="0" hangingPunct="1">
+              <a:defRPr sz="1800" kern="1200">
+                <a:solidFill>
+                  <a:schemeClr val="lt1"/>
+                </a:solidFill>
+                <a:latin typeface="+mn-lt"/>
+                <a:ea typeface="+mn-ea"/>
+                <a:cs typeface="+mn-cs"/>
+              </a:defRPr>
+            </a:lvl5pPr>
+            <a:lvl6pPr marL="2286000" algn="l" defTabSz="914400" rtl="0" eaLnBrk="1" latinLnBrk="0" hangingPunct="1">
+              <a:defRPr sz="1800" kern="1200">
+                <a:solidFill>
+                  <a:schemeClr val="lt1"/>
+                </a:solidFill>
+                <a:latin typeface="+mn-lt"/>
+                <a:ea typeface="+mn-ea"/>
+                <a:cs typeface="+mn-cs"/>
+              </a:defRPr>
+            </a:lvl6pPr>
+            <a:lvl7pPr marL="2743200" algn="l" defTabSz="914400" rtl="0" eaLnBrk="1" latinLnBrk="0" hangingPunct="1">
+              <a:defRPr sz="1800" kern="1200">
+                <a:solidFill>
+                  <a:schemeClr val="lt1"/>
+                </a:solidFill>
+                <a:latin typeface="+mn-lt"/>
+                <a:ea typeface="+mn-ea"/>
+                <a:cs typeface="+mn-cs"/>
+              </a:defRPr>
+            </a:lvl7pPr>
+            <a:lvl8pPr marL="3200400" algn="l" defTabSz="914400" rtl="0" eaLnBrk="1" latinLnBrk="0" hangingPunct="1">
+              <a:defRPr sz="1800" kern="1200">
+                <a:solidFill>
+                  <a:schemeClr val="lt1"/>
+                </a:solidFill>
+                <a:latin typeface="+mn-lt"/>
+                <a:ea typeface="+mn-ea"/>
+                <a:cs typeface="+mn-cs"/>
+              </a:defRPr>
+            </a:lvl8pPr>
+            <a:lvl9pPr marL="3657600" algn="l" defTabSz="914400" rtl="0" eaLnBrk="1" latinLnBrk="0" hangingPunct="1">
+              <a:defRPr sz="1800" kern="1200">
+                <a:solidFill>
+                  <a:schemeClr val="lt1"/>
+                </a:solidFill>
+                <a:latin typeface="+mn-lt"/>
+                <a:ea typeface="+mn-ea"/>
+                <a:cs typeface="+mn-cs"/>
+              </a:defRPr>
+            </a:lvl9pPr>
+          </a:lstStyle>
+          <a:p>
+            <a:pPr algn="ctr"/>
+            <a:endParaRPr lang="en-US" dirty="0"/>
+          </a:p>
+        </p:txBody>
+      </p:sp>
+      <p:sp>
+        <p:nvSpPr>
+          <p:cNvPr id="32" name="Rectangle 31">
+            <a:extLst>
+              <a:ext uri="{FF2B5EF4-FFF2-40B4-BE49-F238E27FC236}">
+                <a16:creationId xmlns:a16="http://schemas.microsoft.com/office/drawing/2014/main" id="{A567A692-E165-4BCD-842C-A9081974A9F8}"/>
+              </a:ext>
+              <a:ext uri="{C183D7F6-B498-43B3-948B-1728B52AA6E4}">
+                <adec:decorative xmlns:adec="http://schemas.microsoft.com/office/drawing/2017/decorative" val="1"/>
+              </a:ext>
+            </a:extLst>
+          </p:cNvPr>
+          <p:cNvSpPr>
+            <a:spLocks noGrp="1" noRot="1" noChangeAspect="1" noMove="1" noResize="1" noEditPoints="1" noAdjustHandles="1" noChangeArrowheads="1" noChangeShapeType="1" noTextEdit="1"/>
+          </p:cNvSpPr>
+          <p:nvPr>
+            <p:extLst>
+              <p:ext uri="{386F3935-93C4-4BCD-93E2-E3B085C9AB24}">
+                <p16:designElem xmlns:p16="http://schemas.microsoft.com/office/powerpoint/2015/main" val="1"/>
+              </p:ext>
+            </p:extLst>
+          </p:nvPr>
+        </p:nvSpPr>
+        <p:spPr>
+          <a:xfrm>
+            <a:off x="1446276" y="685800"/>
+            <a:ext cx="10744200" cy="5486400"/>
+          </a:xfrm>
+          <a:prstGeom prst="rect">
+            <a:avLst/>
+          </a:prstGeom>
+          <a:solidFill>
+            <a:schemeClr val="bg1"/>
+          </a:solidFill>
+          <a:ln>
+            <a:noFill/>
+          </a:ln>
+        </p:spPr>
+        <p:style>
+          <a:lnRef idx="2">
+            <a:schemeClr val="accent1">
+              <a:shade val="50000"/>
+            </a:schemeClr>
+          </a:lnRef>
+          <a:fillRef idx="1">
+            <a:schemeClr val="accent1"/>
+          </a:fillRef>
+          <a:effectRef idx="0">
+            <a:schemeClr val="accent1"/>
+          </a:effectRef>
+          <a:fontRef idx="minor">
+            <a:schemeClr val="lt1"/>
+          </a:fontRef>
+        </p:style>
+        <p:txBody>
+          <a:bodyPr rtlCol="0" anchor="ctr"/>
+          <a:lstStyle/>
+          <a:p>
+            <a:pPr algn="ctr"/>
+            <a:endParaRPr lang="en-US"/>
+          </a:p>
+        </p:txBody>
+      </p:sp>
+      <p:sp>
+        <p:nvSpPr>
+          <p:cNvPr id="34" name="Rectangle 33">
+            <a:extLst>
+              <a:ext uri="{FF2B5EF4-FFF2-40B4-BE49-F238E27FC236}">
+                <a16:creationId xmlns:a16="http://schemas.microsoft.com/office/drawing/2014/main" id="{20616EB7-E723-4BF0-AC20-B8CD75A4FC12}"/>
+              </a:ext>
+              <a:ext uri="{C183D7F6-B498-43B3-948B-1728B52AA6E4}">
+                <adec:decorative xmlns:adec="http://schemas.microsoft.com/office/drawing/2017/decorative" val="1"/>
+              </a:ext>
+            </a:extLst>
+          </p:cNvPr>
+          <p:cNvSpPr>
+            <a:spLocks noGrp="1" noRot="1" noChangeAspect="1" noMove="1" noResize="1" noEditPoints="1" noAdjustHandles="1" noChangeArrowheads="1" noChangeShapeType="1" noTextEdit="1"/>
+          </p:cNvSpPr>
+          <p:nvPr>
+            <p:extLst>
+              <p:ext uri="{386F3935-93C4-4BCD-93E2-E3B085C9AB24}">
+                <p16:designElem xmlns:p16="http://schemas.microsoft.com/office/powerpoint/2015/main" val="1"/>
+              </p:ext>
+            </p:extLst>
+          </p:nvPr>
+        </p:nvSpPr>
+        <p:spPr>
+          <a:xfrm rot="10800000">
+            <a:off x="11496180" y="680188"/>
+            <a:ext cx="695819" cy="5486399"/>
+          </a:xfrm>
+          <a:prstGeom prst="rect">
+            <a:avLst/>
+          </a:prstGeom>
+          <a:solidFill>
+            <a:srgbClr val="3FC1F8">
+              <a:alpha val="25000"/>
+            </a:srgbClr>
+          </a:solidFill>
+          <a:ln w="25400" cap="flat">
+            <a:noFill/>
+            <a:prstDash val="solid"/>
+            <a:round/>
+          </a:ln>
+          <a:effectLst/>
+          <a:sp3d/>
+        </p:spPr>
+        <p:style>
+          <a:lnRef idx="0">
+            <a:scrgbClr r="0" g="0" b="0"/>
+          </a:lnRef>
+          <a:fillRef idx="0">
+            <a:scrgbClr r="0" g="0" b="0"/>
+          </a:fillRef>
+          <a:effectRef idx="0">
+            <a:scrgbClr r="0" g="0" b="0"/>
+          </a:effectRef>
+          <a:fontRef idx="none"/>
+        </p:style>
+        <p:txBody>
+          <a:bodyPr rot="0" spcFirstLastPara="1" vertOverflow="overflow" horzOverflow="overflow" vert="horz" wrap="square" lIns="0" tIns="0" rIns="0" bIns="0" numCol="1" spcCol="38100" rtlCol="0" anchor="ctr">
+            <a:spAutoFit/>
+          </a:bodyPr>
+          <a:lstStyle/>
+          <a:p>
+            <a:pPr marL="0" marR="0" indent="0" algn="ctr" defTabSz="825500" rtl="0" fontAlgn="auto" latinLnBrk="0" hangingPunct="0">
+              <a:lnSpc>
+                <a:spcPct val="100000"/>
+              </a:lnSpc>
+              <a:spcBef>
+                <a:spcPts val="0"/>
+              </a:spcBef>
+              <a:spcAft>
+                <a:spcPts val="0"/>
+              </a:spcAft>
+              <a:buClrTx/>
+              <a:buSzTx/>
+              <a:buFontTx/>
+              <a:buNone/>
+              <a:tabLst/>
+            </a:pPr>
+            <a:endParaRPr kumimoji="0" lang="en-US" sz="3000" b="0" i="0" u="none" strike="noStrike" cap="none" spc="0" normalizeH="0" baseline="0">
+              <a:ln>
+                <a:noFill/>
+              </a:ln>
+              <a:solidFill>
+                <a:srgbClr val="000000"/>
+              </a:solidFill>
+              <a:effectLst/>
+              <a:uFillTx/>
+              <a:latin typeface="Helvetica Neue Medium"/>
+              <a:ea typeface="Helvetica Neue Medium"/>
+              <a:cs typeface="Helvetica Neue Medium"/>
+              <a:sym typeface="Helvetica Neue Medium"/>
+            </a:endParaRPr>
+          </a:p>
+        </p:txBody>
+      </p:sp>
+      <p:cxnSp>
+        <p:nvCxnSpPr>
+          <p:cNvPr id="36" name="Straight Connector 35">
+            <a:extLst>
+              <a:ext uri="{FF2B5EF4-FFF2-40B4-BE49-F238E27FC236}">
+                <a16:creationId xmlns:a16="http://schemas.microsoft.com/office/drawing/2014/main" id="{35D3937F-89B8-4A4C-BA42-C663D9B6C8E3}"/>
+              </a:ext>
+              <a:ext uri="{C183D7F6-B498-43B3-948B-1728B52AA6E4}">
+                <adec:decorative xmlns:adec="http://schemas.microsoft.com/office/drawing/2017/decorative" val="1"/>
+              </a:ext>
+            </a:extLst>
+          </p:cNvPr>
+          <p:cNvCxnSpPr>
+            <a:cxnSpLocks noGrp="1" noRot="1" noChangeAspect="1" noMove="1" noResize="1" noEditPoints="1" noAdjustHandles="1" noChangeArrowheads="1" noChangeShapeType="1"/>
+          </p:cNvCxnSpPr>
+          <p:nvPr>
+            <p:extLst>
+              <p:ext uri="{386F3935-93C4-4BCD-93E2-E3B085C9AB24}">
+                <p16:designElem xmlns:p16="http://schemas.microsoft.com/office/powerpoint/2015/main" val="1"/>
+              </p:ext>
+            </p:extLst>
+          </p:nvPr>
+        </p:nvCxnSpPr>
+        <p:spPr>
+          <a:xfrm flipV="1">
+            <a:off x="11496184" y="5610"/>
+            <a:ext cx="0" cy="6858000"/>
+          </a:xfrm>
+          <a:prstGeom prst="line">
+            <a:avLst/>
+          </a:prstGeom>
+          <a:ln w="9525" cap="rnd">
+            <a:solidFill>
+              <a:srgbClr val="3FC1F8"/>
+            </a:solidFill>
+            <a:prstDash val="dash"/>
+          </a:ln>
+        </p:spPr>
+        <p:style>
+          <a:lnRef idx="1">
+            <a:schemeClr val="accent1"/>
+          </a:lnRef>
+          <a:fillRef idx="0">
+            <a:schemeClr val="accent1"/>
+          </a:fillRef>
+          <a:effectRef idx="0">
+            <a:schemeClr val="accent1"/>
+          </a:effectRef>
+          <a:fontRef idx="minor">
+            <a:schemeClr val="tx1"/>
+          </a:fontRef>
+        </p:style>
+      </p:cxnSp>
+      <p:cxnSp>
+        <p:nvCxnSpPr>
+          <p:cNvPr id="38" name="Straight Connector 37">
+            <a:extLst>
+              <a:ext uri="{FF2B5EF4-FFF2-40B4-BE49-F238E27FC236}">
+                <a16:creationId xmlns:a16="http://schemas.microsoft.com/office/drawing/2014/main" id="{F04C3AED-6D36-45C0-95CD-A7378D9DD6C3}"/>
+              </a:ext>
+              <a:ext uri="{C183D7F6-B498-43B3-948B-1728B52AA6E4}">
+                <adec:decorative xmlns:adec="http://schemas.microsoft.com/office/drawing/2017/decorative" val="1"/>
+              </a:ext>
+            </a:extLst>
+          </p:cNvPr>
+          <p:cNvCxnSpPr>
+            <a:cxnSpLocks noGrp="1" noRot="1" noChangeAspect="1" noMove="1" noResize="1" noEditPoints="1" noAdjustHandles="1" noChangeArrowheads="1" noChangeShapeType="1"/>
+          </p:cNvCxnSpPr>
+          <p:nvPr>
+            <p:extLst>
+              <p:ext uri="{386F3935-93C4-4BCD-93E2-E3B085C9AB24}">
+                <p16:designElem xmlns:p16="http://schemas.microsoft.com/office/powerpoint/2015/main" val="1"/>
+              </p:ext>
+            </p:extLst>
+          </p:nvPr>
+        </p:nvCxnSpPr>
+        <p:spPr>
+          <a:xfrm>
+            <a:off x="1524" y="6172200"/>
+            <a:ext cx="12192000" cy="0"/>
+          </a:xfrm>
+          <a:prstGeom prst="line">
+            <a:avLst/>
+          </a:prstGeom>
+          <a:solidFill>
+            <a:srgbClr val="3FC1F8"/>
+          </a:solidFill>
+          <a:ln w="9525" cap="rnd">
+            <a:solidFill>
+              <a:schemeClr val="accent1"/>
+            </a:solidFill>
+            <a:prstDash val="dash"/>
+          </a:ln>
+        </p:spPr>
+        <p:style>
+          <a:lnRef idx="1">
+            <a:schemeClr val="accent1"/>
+          </a:lnRef>
+          <a:fillRef idx="0">
+            <a:schemeClr val="accent1"/>
+          </a:fillRef>
+          <a:effectRef idx="0">
+            <a:schemeClr val="accent1"/>
+          </a:effectRef>
+          <a:fontRef idx="minor">
+            <a:schemeClr val="tx1"/>
+          </a:fontRef>
+        </p:style>
+      </p:cxnSp>
+      <p:pic>
+        <p:nvPicPr>
+          <p:cNvPr id="6" name="Picture 5" descr="A picture containing shape&#10;&#10;Description automatically generated">
+            <a:extLst>
+              <a:ext uri="{FF2B5EF4-FFF2-40B4-BE49-F238E27FC236}">
+                <a16:creationId xmlns:a16="http://schemas.microsoft.com/office/drawing/2014/main" id="{154CBE51-93AD-41C7-9776-41EB07A4D13B}"/>
+              </a:ext>
+            </a:extLst>
+          </p:cNvPr>
+          <p:cNvPicPr>
+            <a:picLocks noChangeAspect="1"/>
+          </p:cNvPicPr>
+          <p:nvPr/>
+        </p:nvPicPr>
+        <p:blipFill>
+          <a:blip r:embed="rId2">
+            <a:extLst>
+              <a:ext uri="{28A0092B-C50C-407E-A947-70E740481C1C}">
+                <a14:useLocalDpi xmlns:a14="http://schemas.microsoft.com/office/drawing/2010/main" val="0"/>
+              </a:ext>
+            </a:extLst>
+          </a:blip>
+          <a:stretch>
+            <a:fillRect/>
+          </a:stretch>
+        </p:blipFill>
+        <p:spPr>
+          <a:xfrm>
+            <a:off x="11560631" y="6212844"/>
+            <a:ext cx="628320" cy="628320"/>
+          </a:xfrm>
+          <a:prstGeom prst="rect">
+            <a:avLst/>
+          </a:prstGeom>
+        </p:spPr>
+      </p:pic>
+      <p:sp>
+        <p:nvSpPr>
+          <p:cNvPr id="19" name="Title 1">
+            <a:extLst>
+              <a:ext uri="{FF2B5EF4-FFF2-40B4-BE49-F238E27FC236}">
+                <a16:creationId xmlns:a16="http://schemas.microsoft.com/office/drawing/2014/main" id="{EA9A5F1F-098B-407D-8466-39E797E06AD4}"/>
+              </a:ext>
+            </a:extLst>
+          </p:cNvPr>
+          <p:cNvSpPr txBox="1">
+            <a:spLocks/>
+          </p:cNvSpPr>
+          <p:nvPr/>
+        </p:nvSpPr>
+        <p:spPr>
+          <a:xfrm>
+            <a:off x="422899" y="576263"/>
+            <a:ext cx="5616236" cy="2967606"/>
+          </a:xfrm>
+          <a:prstGeom prst="rect">
+            <a:avLst/>
+          </a:prstGeom>
+        </p:spPr>
+        <p:txBody>
+          <a:bodyPr vert="horz" lIns="91440" tIns="45720" rIns="91440" bIns="45720" rtlCol="0" anchor="b">
+            <a:normAutofit/>
+          </a:bodyPr>
+          <a:lstStyle>
+            <a:lvl1pPr algn="ctr" defTabSz="914400" rtl="0" eaLnBrk="1" latinLnBrk="0" hangingPunct="1">
+              <a:lnSpc>
+                <a:spcPct val="90000"/>
+              </a:lnSpc>
+              <a:spcBef>
+                <a:spcPct val="0"/>
+              </a:spcBef>
+              <a:buNone/>
+              <a:defRPr sz="5200" kern="1200">
+                <a:solidFill>
+                  <a:schemeClr val="tx2"/>
+                </a:solidFill>
+                <a:latin typeface="+mj-lt"/>
+                <a:ea typeface="+mj-ea"/>
+                <a:cs typeface="+mj-cs"/>
+              </a:defRPr>
+            </a:lvl1pPr>
+          </a:lstStyle>
+          <a:p>
+            <a:pPr algn="l"/>
+            <a:r>
+              <a:rPr lang="en-US" sz="4800" dirty="0">
+                <a:solidFill>
+                  <a:srgbClr val="626971"/>
+                </a:solidFill>
+                <a:latin typeface="Helvetica Neue Medium"/>
+              </a:rPr>
+              <a:t>Goal</a:t>
+            </a:r>
+          </a:p>
+        </p:txBody>
+      </p:sp>
+      <mc:AlternateContent xmlns:mc="http://schemas.openxmlformats.org/markup-compatibility/2006" xmlns:cx2="http://schemas.microsoft.com/office/drawing/2015/10/21/chartex">
+        <mc:Choice Requires="cx2">
+          <p:graphicFrame>
+            <p:nvGraphicFramePr>
+              <p:cNvPr id="7" name="Chart 6">
+                <a:extLst>
+                  <a:ext uri="{FF2B5EF4-FFF2-40B4-BE49-F238E27FC236}">
+                    <a16:creationId xmlns:a16="http://schemas.microsoft.com/office/drawing/2014/main" id="{B639C36A-9B74-4254-80AA-1469CFD551A2}"/>
+                  </a:ext>
+                </a:extLst>
+              </p:cNvPr>
+              <p:cNvGraphicFramePr/>
+              <p:nvPr>
+                <p:extLst>
+                  <p:ext uri="{D42A27DB-BD31-4B8C-83A1-F6EECF244321}">
+                    <p14:modId xmlns:p14="http://schemas.microsoft.com/office/powerpoint/2010/main" val="3772042613"/>
+                  </p:ext>
+                </p:extLst>
+              </p:nvPr>
+            </p:nvGraphicFramePr>
+            <p:xfrm>
+              <a:off x="4368800" y="1554480"/>
+              <a:ext cx="7146768" cy="5120640"/>
+            </p:xfrm>
+            <a:graphic>
+              <a:graphicData uri="http://schemas.microsoft.com/office/drawing/2014/chartex">
+                <cx:chart xmlns:cx="http://schemas.microsoft.com/office/drawing/2014/chartex" xmlns:r="http://schemas.openxmlformats.org/officeDocument/2006/relationships" r:id="rId3"/>
+              </a:graphicData>
+            </a:graphic>
+          </p:graphicFrame>
+        </mc:Choice>
+        <mc:Fallback xmlns="">
+          <p:pic>
+            <p:nvPicPr>
+              <p:cNvPr id="7" name="Chart 6">
+                <a:extLst>
+                  <a:ext uri="{FF2B5EF4-FFF2-40B4-BE49-F238E27FC236}">
+                    <a16:creationId xmlns:a16="http://schemas.microsoft.com/office/drawing/2014/main" id="{B639C36A-9B74-4254-80AA-1469CFD551A2}"/>
+                  </a:ext>
+                </a:extLst>
+              </p:cNvPr>
+              <p:cNvPicPr>
+                <a:picLocks noGrp="1" noRot="1" noChangeAspect="1" noMove="1" noResize="1" noEditPoints="1" noAdjustHandles="1" noChangeArrowheads="1" noChangeShapeType="1"/>
+              </p:cNvPicPr>
+              <p:nvPr/>
+            </p:nvPicPr>
+            <p:blipFill>
+              <a:blip r:embed="rId4"/>
+              <a:stretch>
+                <a:fillRect/>
+              </a:stretch>
+            </p:blipFill>
+            <p:spPr>
+              <a:xfrm>
+                <a:off x="4368800" y="1554480"/>
+                <a:ext cx="7146768" cy="5120640"/>
+              </a:xfrm>
+              <a:prstGeom prst="rect">
+                <a:avLst/>
+              </a:prstGeom>
+            </p:spPr>
+          </p:pic>
+        </mc:Fallback>
+      </mc:AlternateContent>
+      <p:sp>
+        <p:nvSpPr>
+          <p:cNvPr id="8" name="TextBox 7">
+            <a:extLst>
+              <a:ext uri="{FF2B5EF4-FFF2-40B4-BE49-F238E27FC236}">
+                <a16:creationId xmlns:a16="http://schemas.microsoft.com/office/drawing/2014/main" id="{8150E110-B0E1-49C5-998C-8C5250128400}"/>
+              </a:ext>
+            </a:extLst>
+          </p:cNvPr>
+          <p:cNvSpPr txBox="1"/>
+          <p:nvPr/>
+        </p:nvSpPr>
+        <p:spPr>
+          <a:xfrm>
+            <a:off x="4461164" y="1634836"/>
+            <a:ext cx="6970570" cy="830997"/>
+          </a:xfrm>
+          <a:prstGeom prst="rect">
+            <a:avLst/>
+          </a:prstGeom>
+          <a:noFill/>
+        </p:spPr>
+        <p:txBody>
+          <a:bodyPr wrap="square" rtlCol="0">
+            <a:spAutoFit/>
+          </a:bodyPr>
+          <a:lstStyle/>
+          <a:p>
+            <a:pPr algn="ctr"/>
+            <a:r>
+              <a:rPr lang="en-US" sz="2400" dirty="0">
+                <a:solidFill>
+                  <a:srgbClr val="626971"/>
+                </a:solidFill>
+                <a:latin typeface="Helvetica Neue Medium"/>
+              </a:rPr>
+              <a:t>Find common attributes that correlate with player dynasty values</a:t>
+            </a:r>
+          </a:p>
+        </p:txBody>
+      </p:sp>
+      <p:sp>
+        <p:nvSpPr>
+          <p:cNvPr id="10" name="TextBox 9">
+            <a:extLst>
+              <a:ext uri="{FF2B5EF4-FFF2-40B4-BE49-F238E27FC236}">
+                <a16:creationId xmlns:a16="http://schemas.microsoft.com/office/drawing/2014/main" id="{657AF5F3-526A-4EBD-83B4-C13D4FFDE4C1}"/>
+              </a:ext>
+            </a:extLst>
+          </p:cNvPr>
+          <p:cNvSpPr txBox="1"/>
+          <p:nvPr/>
+        </p:nvSpPr>
+        <p:spPr>
+          <a:xfrm>
+            <a:off x="5190836" y="2660073"/>
+            <a:ext cx="5477164" cy="830997"/>
+          </a:xfrm>
+          <a:prstGeom prst="rect">
+            <a:avLst/>
+          </a:prstGeom>
+          <a:noFill/>
+        </p:spPr>
+        <p:txBody>
+          <a:bodyPr wrap="square" rtlCol="0">
+            <a:spAutoFit/>
+          </a:bodyPr>
+          <a:lstStyle/>
+          <a:p>
+            <a:pPr algn="ctr"/>
+            <a:r>
+              <a:rPr lang="en-US" sz="2400" dirty="0">
+                <a:solidFill>
+                  <a:srgbClr val="CFEFFD"/>
+                </a:solidFill>
+                <a:latin typeface="Helvetica Neue Medium"/>
+              </a:rPr>
+              <a:t>Compare a player’s dynasty value to those of selected position group</a:t>
+            </a:r>
+          </a:p>
+        </p:txBody>
+      </p:sp>
+      <p:sp>
+        <p:nvSpPr>
+          <p:cNvPr id="11" name="TextBox 10">
+            <a:extLst>
+              <a:ext uri="{FF2B5EF4-FFF2-40B4-BE49-F238E27FC236}">
+                <a16:creationId xmlns:a16="http://schemas.microsoft.com/office/drawing/2014/main" id="{49CAA38B-C05D-49E7-B564-C0D44D30DCB7}"/>
+              </a:ext>
+            </a:extLst>
+          </p:cNvPr>
+          <p:cNvSpPr txBox="1"/>
+          <p:nvPr/>
+        </p:nvSpPr>
+        <p:spPr>
+          <a:xfrm>
+            <a:off x="5874327" y="3653406"/>
+            <a:ext cx="4110182" cy="830997"/>
+          </a:xfrm>
+          <a:prstGeom prst="rect">
+            <a:avLst/>
+          </a:prstGeom>
+          <a:noFill/>
+        </p:spPr>
+        <p:txBody>
+          <a:bodyPr wrap="square" rtlCol="0">
+            <a:spAutoFit/>
+          </a:bodyPr>
+          <a:lstStyle/>
+          <a:p>
+            <a:pPr algn="ctr"/>
+            <a:r>
+              <a:rPr lang="en-US" sz="2400" dirty="0">
+                <a:solidFill>
+                  <a:srgbClr val="CFEFFD"/>
+                </a:solidFill>
+                <a:latin typeface="Helvetica Neue Medium"/>
+              </a:rPr>
+              <a:t>Compare two players against each other</a:t>
+            </a:r>
+          </a:p>
+        </p:txBody>
+      </p:sp>
+      <p:sp>
+        <p:nvSpPr>
+          <p:cNvPr id="21" name="Subtitle 2">
+            <a:extLst>
+              <a:ext uri="{FF2B5EF4-FFF2-40B4-BE49-F238E27FC236}">
+                <a16:creationId xmlns:a16="http://schemas.microsoft.com/office/drawing/2014/main" id="{F1FDC1FB-79A0-46DC-B541-B8C2AEFA0BF6}"/>
+              </a:ext>
+            </a:extLst>
+          </p:cNvPr>
+          <p:cNvSpPr>
+            <a:spLocks noGrp="1"/>
+          </p:cNvSpPr>
+          <p:nvPr>
+            <p:ph type="subTitle" idx="1"/>
+          </p:nvPr>
+        </p:nvSpPr>
+        <p:spPr>
+          <a:xfrm>
+            <a:off x="422899" y="3764975"/>
+            <a:ext cx="3613392" cy="2192683"/>
+          </a:xfrm>
+        </p:spPr>
+        <p:txBody>
+          <a:bodyPr>
+            <a:normAutofit/>
+          </a:bodyPr>
+          <a:lstStyle/>
+          <a:p>
+            <a:pPr algn="l"/>
+            <a:r>
+              <a:rPr lang="en-US" dirty="0">
+                <a:solidFill>
+                  <a:srgbClr val="626971"/>
+                </a:solidFill>
+                <a:latin typeface="Helvetica Neue Medium"/>
+              </a:rPr>
+              <a:t>Help you make decisions about your players</a:t>
+            </a:r>
+          </a:p>
+        </p:txBody>
+      </p:sp>
+    </p:spTree>
+    <p:extLst>
+      <p:ext uri="{BB962C8B-B14F-4D97-AF65-F5344CB8AC3E}">
+        <p14:creationId xmlns:p14="http://schemas.microsoft.com/office/powerpoint/2010/main" val="2274517742"/>
       </p:ext>
     </p:extLst>
   </p:cSld>

</xml_diff>